<commit_message>
updated Guided Capstone Project Slide Deck.pptx
</commit_message>
<xml_diff>
--- a/Guided Capstone Project Slide Deck.pptx
+++ b/Guided Capstone Project Slide Deck.pptx
@@ -5,21 +5,18 @@
     <p:sldMasterId id="2147483696" r:id="rId1"/>
   </p:sldMasterIdLst>
   <p:notesMasterIdLst>
-    <p:notesMasterId r:id="rId14"/>
+    <p:notesMasterId r:id="rId11"/>
   </p:notesMasterIdLst>
   <p:sldIdLst>
     <p:sldId id="266" r:id="rId2"/>
-    <p:sldId id="256" r:id="rId3"/>
-    <p:sldId id="257" r:id="rId4"/>
-    <p:sldId id="267" r:id="rId5"/>
-    <p:sldId id="258" r:id="rId6"/>
-    <p:sldId id="265" r:id="rId7"/>
-    <p:sldId id="264" r:id="rId8"/>
-    <p:sldId id="268" r:id="rId9"/>
-    <p:sldId id="269" r:id="rId10"/>
-    <p:sldId id="270" r:id="rId11"/>
-    <p:sldId id="271" r:id="rId12"/>
-    <p:sldId id="262" r:id="rId13"/>
+    <p:sldId id="257" r:id="rId3"/>
+    <p:sldId id="258" r:id="rId4"/>
+    <p:sldId id="265" r:id="rId5"/>
+    <p:sldId id="264" r:id="rId6"/>
+    <p:sldId id="268" r:id="rId7"/>
+    <p:sldId id="269" r:id="rId8"/>
+    <p:sldId id="270" r:id="rId9"/>
+    <p:sldId id="262" r:id="rId10"/>
   </p:sldIdLst>
   <p:sldSz cx="12192000" cy="6858000"/>
   <p:notesSz cx="6858000" cy="9144000"/>
@@ -540,91 +537,7 @@
           <a:p>
             <a:fld id="{AA499EE4-AFF7-DB4F-BE58-31406A547856}" type="slidenum">
               <a:rPr lang="en-US" smtClean="0"/>
-              <a:t>2</a:t>
-            </a:fld>
-            <a:endParaRPr lang="en-US"/>
-          </a:p>
-        </p:txBody>
-      </p:sp>
-    </p:spTree>
-    <p:extLst>
-      <p:ext uri="{BB962C8B-B14F-4D97-AF65-F5344CB8AC3E}">
-        <p14:creationId xmlns:p14="http://schemas.microsoft.com/office/powerpoint/2010/main" val="2866704434"/>
-      </p:ext>
-    </p:extLst>
-  </p:cSld>
-  <p:clrMapOvr>
-    <a:masterClrMapping/>
-  </p:clrMapOvr>
-</p:notes>
-</file>
-
-<file path=ppt/notesSlides/notesSlide2.xml><?xml version="1.0" encoding="utf-8"?>
-<p:notes xmlns:a="http://schemas.openxmlformats.org/drawingml/2006/main" xmlns:r="http://schemas.openxmlformats.org/officeDocument/2006/relationships" xmlns:p="http://schemas.openxmlformats.org/presentationml/2006/main">
-  <p:cSld>
-    <p:spTree>
-      <p:nvGrpSpPr>
-        <p:cNvPr id="1" name=""/>
-        <p:cNvGrpSpPr/>
-        <p:nvPr/>
-      </p:nvGrpSpPr>
-      <p:grpSpPr>
-        <a:xfrm>
-          <a:off x="0" y="0"/>
-          <a:ext cx="0" cy="0"/>
-          <a:chOff x="0" y="0"/>
-          <a:chExt cx="0" cy="0"/>
-        </a:xfrm>
-      </p:grpSpPr>
-      <p:sp>
-        <p:nvSpPr>
-          <p:cNvPr id="2" name="Slide Image Placeholder 1"/>
-          <p:cNvSpPr>
-            <a:spLocks noGrp="1" noRot="1" noChangeAspect="1"/>
-          </p:cNvSpPr>
-          <p:nvPr>
-            <p:ph type="sldImg"/>
-          </p:nvPr>
-        </p:nvSpPr>
-        <p:spPr/>
-      </p:sp>
-      <p:sp>
-        <p:nvSpPr>
-          <p:cNvPr id="3" name="Notes Placeholder 2"/>
-          <p:cNvSpPr>
-            <a:spLocks noGrp="1"/>
-          </p:cNvSpPr>
-          <p:nvPr>
-            <p:ph type="body" idx="1"/>
-          </p:nvPr>
-        </p:nvSpPr>
-        <p:spPr/>
-        <p:txBody>
-          <a:bodyPr/>
-          <a:lstStyle/>
-          <a:p>
-            <a:endParaRPr lang="en-US" dirty="0"/>
-          </a:p>
-        </p:txBody>
-      </p:sp>
-      <p:sp>
-        <p:nvSpPr>
-          <p:cNvPr id="4" name="Slide Number Placeholder 3"/>
-          <p:cNvSpPr>
-            <a:spLocks noGrp="1"/>
-          </p:cNvSpPr>
-          <p:nvPr>
-            <p:ph type="sldNum" sz="quarter" idx="5"/>
-          </p:nvPr>
-        </p:nvSpPr>
-        <p:spPr/>
-        <p:txBody>
-          <a:bodyPr/>
-          <a:lstStyle/>
-          <a:p>
-            <a:fld id="{AA499EE4-AFF7-DB4F-BE58-31406A547856}" type="slidenum">
-              <a:rPr lang="en-US" smtClean="0"/>
-              <a:t>5</a:t>
+              <a:t>3</a:t>
             </a:fld>
             <a:endParaRPr lang="en-US"/>
           </a:p>
@@ -3907,1156 +3820,7 @@
 </p:sld>
 </file>
 
-<file path=ppt/slides/slide10.xml><?xml version="1.0" encoding="utf-8"?>
-<p:sld xmlns:a="http://schemas.openxmlformats.org/drawingml/2006/main" xmlns:r="http://schemas.openxmlformats.org/officeDocument/2006/relationships" xmlns:p="http://schemas.openxmlformats.org/presentationml/2006/main">
-  <p:cSld>
-    <p:spTree>
-      <p:nvGrpSpPr>
-        <p:cNvPr id="1" name=""/>
-        <p:cNvGrpSpPr/>
-        <p:nvPr/>
-      </p:nvGrpSpPr>
-      <p:grpSpPr>
-        <a:xfrm>
-          <a:off x="0" y="0"/>
-          <a:ext cx="0" cy="0"/>
-          <a:chOff x="0" y="0"/>
-          <a:chExt cx="0" cy="0"/>
-        </a:xfrm>
-      </p:grpSpPr>
-      <p:pic>
-        <p:nvPicPr>
-          <p:cNvPr id="15" name="Picture 14">
-            <a:extLst>
-              <a:ext uri="{FF2B5EF4-FFF2-40B4-BE49-F238E27FC236}">
-                <a16:creationId xmlns:a16="http://schemas.microsoft.com/office/drawing/2014/main" id="{D7CEA2D1-EA7A-EE38-42A1-E047C1A0A9A0}"/>
-              </a:ext>
-            </a:extLst>
-          </p:cNvPr>
-          <p:cNvPicPr>
-            <a:picLocks noChangeAspect="1"/>
-          </p:cNvPicPr>
-          <p:nvPr/>
-        </p:nvPicPr>
-        <p:blipFill>
-          <a:blip r:embed="rId2"/>
-          <a:srcRect/>
-          <a:stretch/>
-        </p:blipFill>
-        <p:spPr>
-          <a:xfrm>
-            <a:off x="6465852" y="241961"/>
-            <a:ext cx="5701965" cy="3163549"/>
-          </a:xfrm>
-          <a:prstGeom prst="rect">
-            <a:avLst/>
-          </a:prstGeom>
-        </p:spPr>
-      </p:pic>
-      <p:pic>
-        <p:nvPicPr>
-          <p:cNvPr id="17" name="Picture 16">
-            <a:extLst>
-              <a:ext uri="{FF2B5EF4-FFF2-40B4-BE49-F238E27FC236}">
-                <a16:creationId xmlns:a16="http://schemas.microsoft.com/office/drawing/2014/main" id="{22F6911D-9F7A-FC6F-9D83-444A81D709D8}"/>
-              </a:ext>
-            </a:extLst>
-          </p:cNvPr>
-          <p:cNvPicPr>
-            <a:picLocks noChangeAspect="1"/>
-          </p:cNvPicPr>
-          <p:nvPr/>
-        </p:nvPicPr>
-        <p:blipFill>
-          <a:blip r:embed="rId3"/>
-          <a:srcRect/>
-          <a:stretch/>
-        </p:blipFill>
-        <p:spPr>
-          <a:xfrm>
-            <a:off x="6437437" y="3680496"/>
-            <a:ext cx="5754564" cy="3161224"/>
-          </a:xfrm>
-          <a:prstGeom prst="rect">
-            <a:avLst/>
-          </a:prstGeom>
-        </p:spPr>
-      </p:pic>
-      <p:sp>
-        <p:nvSpPr>
-          <p:cNvPr id="18" name="Title 1">
-            <a:extLst>
-              <a:ext uri="{FF2B5EF4-FFF2-40B4-BE49-F238E27FC236}">
-                <a16:creationId xmlns:a16="http://schemas.microsoft.com/office/drawing/2014/main" id="{AC7E46E1-A036-8216-7765-2CBE689D1ACC}"/>
-              </a:ext>
-            </a:extLst>
-          </p:cNvPr>
-          <p:cNvSpPr>
-            <a:spLocks noGrp="1"/>
-          </p:cNvSpPr>
-          <p:nvPr>
-            <p:ph type="title"/>
-          </p:nvPr>
-        </p:nvSpPr>
-        <p:spPr>
-          <a:xfrm>
-            <a:off x="685050" y="734807"/>
-            <a:ext cx="5266045" cy="2177856"/>
-          </a:xfrm>
-        </p:spPr>
-        <p:txBody>
-          <a:bodyPr anchor="b">
-            <a:noAutofit/>
-          </a:bodyPr>
-          <a:lstStyle/>
-          <a:p>
-            <a:r>
-              <a:rPr lang="en-US" sz="3000" dirty="0">
-                <a:latin typeface="+mn-lt"/>
-              </a:rPr>
-              <a:t>Big Mountain has one of the longest runs. Although it is just over half the length of the longest, the longer ones are rare.</a:t>
-            </a:r>
-          </a:p>
-        </p:txBody>
-      </p:sp>
-      <p:sp>
-        <p:nvSpPr>
-          <p:cNvPr id="19" name="Title 1">
-            <a:extLst>
-              <a:ext uri="{FF2B5EF4-FFF2-40B4-BE49-F238E27FC236}">
-                <a16:creationId xmlns:a16="http://schemas.microsoft.com/office/drawing/2014/main" id="{CC99FE75-516F-3DCE-6080-7FE02D010618}"/>
-              </a:ext>
-            </a:extLst>
-          </p:cNvPr>
-          <p:cNvSpPr txBox="1">
-            <a:spLocks/>
-          </p:cNvSpPr>
-          <p:nvPr/>
-        </p:nvSpPr>
-        <p:spPr>
-          <a:xfrm>
-            <a:off x="685049" y="4172180"/>
-            <a:ext cx="5266045" cy="2177855"/>
-          </a:xfrm>
-          <a:prstGeom prst="rect">
-            <a:avLst/>
-          </a:prstGeom>
-        </p:spPr>
-        <p:txBody>
-          <a:bodyPr vert="horz" lIns="91440" tIns="45720" rIns="91440" bIns="45720" rtlCol="0" anchor="b">
-            <a:normAutofit fontScale="97500"/>
-          </a:bodyPr>
-          <a:lstStyle>
-            <a:lvl1pPr algn="l" defTabSz="914400" rtl="0" eaLnBrk="1" latinLnBrk="0" hangingPunct="1">
-              <a:lnSpc>
-                <a:spcPct val="90000"/>
-              </a:lnSpc>
-              <a:spcBef>
-                <a:spcPct val="0"/>
-              </a:spcBef>
-              <a:buNone/>
-              <a:defRPr sz="4400" kern="1200">
-                <a:solidFill>
-                  <a:schemeClr val="tx1"/>
-                </a:solidFill>
-                <a:latin typeface="+mj-lt"/>
-                <a:ea typeface="+mj-ea"/>
-                <a:cs typeface="+mj-cs"/>
-              </a:defRPr>
-            </a:lvl1pPr>
-          </a:lstStyle>
-          <a:p>
-            <a:r>
-              <a:rPr lang="en-US" sz="3100" dirty="0">
-                <a:latin typeface="+mn-lt"/>
-              </a:rPr>
-              <a:t>Big Mountain has one of the longest runs. Although it is just over half the length of the longest, the longer ones are rare.</a:t>
-            </a:r>
-          </a:p>
-        </p:txBody>
-      </p:sp>
-    </p:spTree>
-    <p:extLst>
-      <p:ext uri="{BB962C8B-B14F-4D97-AF65-F5344CB8AC3E}">
-        <p14:creationId xmlns:p14="http://schemas.microsoft.com/office/powerpoint/2010/main" val="3688093235"/>
-      </p:ext>
-    </p:extLst>
-  </p:cSld>
-  <p:clrMapOvr>
-    <a:masterClrMapping/>
-  </p:clrMapOvr>
-  <p:timing>
-    <p:tnLst>
-      <p:par>
-        <p:cTn id="1" dur="indefinite" restart="never" nodeType="tmRoot">
-          <p:childTnLst>
-            <p:seq concurrent="1" nextAc="seek">
-              <p:cTn id="2" dur="indefinite" nodeType="mainSeq">
-                <p:childTnLst>
-                  <p:par>
-                    <p:cTn id="3" fill="hold">
-                      <p:stCondLst>
-                        <p:cond delay="indefinite"/>
-                      </p:stCondLst>
-                      <p:childTnLst>
-                        <p:par>
-                          <p:cTn id="4" fill="hold">
-                            <p:stCondLst>
-                              <p:cond delay="0"/>
-                            </p:stCondLst>
-                            <p:childTnLst>
-                              <p:par>
-                                <p:cTn id="5" presetID="10" presetClass="entr" presetSubtype="0" fill="hold" grpId="0" nodeType="clickEffect">
-                                  <p:stCondLst>
-                                    <p:cond delay="0"/>
-                                  </p:stCondLst>
-                                  <p:childTnLst>
-                                    <p:set>
-                                      <p:cBhvr>
-                                        <p:cTn id="6" dur="1" fill="hold">
-                                          <p:stCondLst>
-                                            <p:cond delay="0"/>
-                                          </p:stCondLst>
-                                        </p:cTn>
-                                        <p:tgtEl>
-                                          <p:spTgt spid="18"/>
-                                        </p:tgtEl>
-                                        <p:attrNameLst>
-                                          <p:attrName>style.visibility</p:attrName>
-                                        </p:attrNameLst>
-                                      </p:cBhvr>
-                                      <p:to>
-                                        <p:strVal val="visible"/>
-                                      </p:to>
-                                    </p:set>
-                                    <p:animEffect transition="in" filter="fade">
-                                      <p:cBhvr>
-                                        <p:cTn id="7" dur="500"/>
-                                        <p:tgtEl>
-                                          <p:spTgt spid="18"/>
-                                        </p:tgtEl>
-                                      </p:cBhvr>
-                                    </p:animEffect>
-                                  </p:childTnLst>
-                                </p:cTn>
-                              </p:par>
-                            </p:childTnLst>
-                          </p:cTn>
-                        </p:par>
-                      </p:childTnLst>
-                    </p:cTn>
-                  </p:par>
-                  <p:par>
-                    <p:cTn id="8" fill="hold">
-                      <p:stCondLst>
-                        <p:cond delay="indefinite"/>
-                      </p:stCondLst>
-                      <p:childTnLst>
-                        <p:par>
-                          <p:cTn id="9" fill="hold">
-                            <p:stCondLst>
-                              <p:cond delay="0"/>
-                            </p:stCondLst>
-                            <p:childTnLst>
-                              <p:par>
-                                <p:cTn id="10" presetID="10" presetClass="entr" presetSubtype="0" fill="hold" grpId="0" nodeType="clickEffect">
-                                  <p:stCondLst>
-                                    <p:cond delay="0"/>
-                                  </p:stCondLst>
-                                  <p:childTnLst>
-                                    <p:set>
-                                      <p:cBhvr>
-                                        <p:cTn id="11" dur="1" fill="hold">
-                                          <p:stCondLst>
-                                            <p:cond delay="0"/>
-                                          </p:stCondLst>
-                                        </p:cTn>
-                                        <p:tgtEl>
-                                          <p:spTgt spid="19"/>
-                                        </p:tgtEl>
-                                        <p:attrNameLst>
-                                          <p:attrName>style.visibility</p:attrName>
-                                        </p:attrNameLst>
-                                      </p:cBhvr>
-                                      <p:to>
-                                        <p:strVal val="visible"/>
-                                      </p:to>
-                                    </p:set>
-                                    <p:animEffect transition="in" filter="fade">
-                                      <p:cBhvr>
-                                        <p:cTn id="12" dur="500"/>
-                                        <p:tgtEl>
-                                          <p:spTgt spid="19"/>
-                                        </p:tgtEl>
-                                      </p:cBhvr>
-                                    </p:animEffect>
-                                  </p:childTnLst>
-                                </p:cTn>
-                              </p:par>
-                            </p:childTnLst>
-                          </p:cTn>
-                        </p:par>
-                      </p:childTnLst>
-                    </p:cTn>
-                  </p:par>
-                </p:childTnLst>
-              </p:cTn>
-              <p:prevCondLst>
-                <p:cond evt="onPrev" delay="0">
-                  <p:tgtEl>
-                    <p:sldTgt/>
-                  </p:tgtEl>
-                </p:cond>
-              </p:prevCondLst>
-              <p:nextCondLst>
-                <p:cond evt="onNext" delay="0">
-                  <p:tgtEl>
-                    <p:sldTgt/>
-                  </p:tgtEl>
-                </p:cond>
-              </p:nextCondLst>
-            </p:seq>
-          </p:childTnLst>
-        </p:cTn>
-      </p:par>
-    </p:tnLst>
-    <p:bldLst>
-      <p:bldP spid="18" grpId="0"/>
-      <p:bldP spid="19" grpId="0"/>
-    </p:bldLst>
-  </p:timing>
-</p:sld>
-</file>
-
-<file path=ppt/slides/slide11.xml><?xml version="1.0" encoding="utf-8"?>
-<p:sld xmlns:a="http://schemas.openxmlformats.org/drawingml/2006/main" xmlns:r="http://schemas.openxmlformats.org/officeDocument/2006/relationships" xmlns:p="http://schemas.openxmlformats.org/presentationml/2006/main">
-  <p:cSld>
-    <p:spTree>
-      <p:nvGrpSpPr>
-        <p:cNvPr id="1" name=""/>
-        <p:cNvGrpSpPr/>
-        <p:nvPr/>
-      </p:nvGrpSpPr>
-      <p:grpSpPr>
-        <a:xfrm>
-          <a:off x="0" y="0"/>
-          <a:ext cx="0" cy="0"/>
-          <a:chOff x="0" y="0"/>
-          <a:chExt cx="0" cy="0"/>
-        </a:xfrm>
-      </p:grpSpPr>
-    </p:spTree>
-    <p:extLst>
-      <p:ext uri="{BB962C8B-B14F-4D97-AF65-F5344CB8AC3E}">
-        <p14:creationId xmlns:p14="http://schemas.microsoft.com/office/powerpoint/2010/main" val="4037194338"/>
-      </p:ext>
-    </p:extLst>
-  </p:cSld>
-  <p:clrMapOvr>
-    <a:masterClrMapping/>
-  </p:clrMapOvr>
-</p:sld>
-</file>
-
-<file path=ppt/slides/slide12.xml><?xml version="1.0" encoding="utf-8"?>
-<p:sld xmlns:a="http://schemas.openxmlformats.org/drawingml/2006/main" xmlns:r="http://schemas.openxmlformats.org/officeDocument/2006/relationships" xmlns:p="http://schemas.openxmlformats.org/presentationml/2006/main">
-  <p:cSld>
-    <p:bg>
-      <p:bgPr>
-        <a:solidFill>
-          <a:schemeClr val="bg1"/>
-        </a:solidFill>
-        <a:effectLst/>
-      </p:bgPr>
-    </p:bg>
-    <p:spTree>
-      <p:nvGrpSpPr>
-        <p:cNvPr id="1" name=""/>
-        <p:cNvGrpSpPr/>
-        <p:nvPr/>
-      </p:nvGrpSpPr>
-      <p:grpSpPr>
-        <a:xfrm>
-          <a:off x="0" y="0"/>
-          <a:ext cx="0" cy="0"/>
-          <a:chOff x="0" y="0"/>
-          <a:chExt cx="0" cy="0"/>
-        </a:xfrm>
-      </p:grpSpPr>
-      <p:sp useBgFill="1">
-        <p:nvSpPr>
-          <p:cNvPr id="9" name="Rectangle 8">
-            <a:extLst>
-              <a:ext uri="{FF2B5EF4-FFF2-40B4-BE49-F238E27FC236}">
-                <a16:creationId xmlns:a16="http://schemas.microsoft.com/office/drawing/2014/main" id="{F13C74B1-5B17-4795-BED0-7140497B445A}"/>
-              </a:ext>
-              <a:ext uri="{C183D7F6-B498-43B3-948B-1728B52AA6E4}">
-                <adec:decorative xmlns:adec="http://schemas.microsoft.com/office/drawing/2017/decorative" val="1"/>
-              </a:ext>
-            </a:extLst>
-          </p:cNvPr>
-          <p:cNvSpPr>
-            <a:spLocks noGrp="1" noRot="1" noChangeAspect="1" noMove="1" noResize="1" noEditPoints="1" noAdjustHandles="1" noChangeArrowheads="1" noChangeShapeType="1" noTextEdit="1"/>
-          </p:cNvSpPr>
-          <p:nvPr>
-            <p:extLst>
-              <p:ext uri="{386F3935-93C4-4BCD-93E2-E3B085C9AB24}">
-                <p16:designElem xmlns:p16="http://schemas.microsoft.com/office/powerpoint/2015/main" val="1"/>
-              </p:ext>
-            </p:extLst>
-          </p:nvPr>
-        </p:nvSpPr>
-        <p:spPr>
-          <a:xfrm>
-            <a:off x="0" y="0"/>
-            <a:ext cx="12188952" cy="6858000"/>
-          </a:xfrm>
-          <a:prstGeom prst="rect">
-            <a:avLst/>
-          </a:prstGeom>
-          <a:ln>
-            <a:noFill/>
-          </a:ln>
-        </p:spPr>
-        <p:style>
-          <a:lnRef idx="2">
-            <a:schemeClr val="accent1">
-              <a:shade val="50000"/>
-            </a:schemeClr>
-          </a:lnRef>
-          <a:fillRef idx="1">
-            <a:schemeClr val="accent1"/>
-          </a:fillRef>
-          <a:effectRef idx="0">
-            <a:schemeClr val="accent1"/>
-          </a:effectRef>
-          <a:fontRef idx="minor">
-            <a:schemeClr val="lt1"/>
-          </a:fontRef>
-        </p:style>
-        <p:txBody>
-          <a:bodyPr rtlCol="0" anchor="ctr"/>
-          <a:lstStyle/>
-          <a:p>
-            <a:pPr algn="ctr"/>
-            <a:endParaRPr lang="en-US"/>
-          </a:p>
-        </p:txBody>
-      </p:sp>
-      <p:sp>
-        <p:nvSpPr>
-          <p:cNvPr id="2" name="Title 1">
-            <a:extLst>
-              <a:ext uri="{FF2B5EF4-FFF2-40B4-BE49-F238E27FC236}">
-                <a16:creationId xmlns:a16="http://schemas.microsoft.com/office/drawing/2014/main" id="{4BC87D8F-3277-AAD6-2480-C887D1D302F9}"/>
-              </a:ext>
-            </a:extLst>
-          </p:cNvPr>
-          <p:cNvSpPr>
-            <a:spLocks noGrp="1"/>
-          </p:cNvSpPr>
-          <p:nvPr>
-            <p:ph type="title"/>
-          </p:nvPr>
-        </p:nvSpPr>
-        <p:spPr>
-          <a:xfrm>
-            <a:off x="640080" y="325369"/>
-            <a:ext cx="4368602" cy="1956841"/>
-          </a:xfrm>
-        </p:spPr>
-        <p:txBody>
-          <a:bodyPr anchor="b">
-            <a:normAutofit/>
-          </a:bodyPr>
-          <a:lstStyle/>
-          <a:p>
-            <a:r>
-              <a:rPr lang="en-US" sz="5400">
-                <a:latin typeface="+mn-lt"/>
-              </a:rPr>
-              <a:t>Conclusion </a:t>
-            </a:r>
-          </a:p>
-        </p:txBody>
-      </p:sp>
-      <p:sp>
-        <p:nvSpPr>
-          <p:cNvPr id="11" name="sketchy line">
-            <a:extLst>
-              <a:ext uri="{FF2B5EF4-FFF2-40B4-BE49-F238E27FC236}">
-                <a16:creationId xmlns:a16="http://schemas.microsoft.com/office/drawing/2014/main" id="{D4974D33-8DC5-464E-8C6D-BE58F0669C17}"/>
-              </a:ext>
-              <a:ext uri="{C183D7F6-B498-43B3-948B-1728B52AA6E4}">
-                <adec:decorative xmlns:adec="http://schemas.microsoft.com/office/drawing/2017/decorative" val="1"/>
-              </a:ext>
-            </a:extLst>
-          </p:cNvPr>
-          <p:cNvSpPr>
-            <a:spLocks noGrp="1" noRot="1" noChangeAspect="1" noMove="1" noResize="1" noEditPoints="1" noAdjustHandles="1" noChangeArrowheads="1" noChangeShapeType="1" noTextEdit="1"/>
-          </p:cNvSpPr>
-          <p:nvPr>
-            <p:extLst>
-              <p:ext uri="{386F3935-93C4-4BCD-93E2-E3B085C9AB24}">
-                <p16:designElem xmlns:p16="http://schemas.microsoft.com/office/powerpoint/2015/main" val="1"/>
-              </p:ext>
-            </p:extLst>
-          </p:nvPr>
-        </p:nvSpPr>
-        <p:spPr>
-          <a:xfrm>
-            <a:off x="640080" y="2586994"/>
-            <a:ext cx="3474720" cy="18288"/>
-          </a:xfrm>
-          <a:custGeom>
-            <a:avLst/>
-            <a:gdLst>
-              <a:gd name="connsiteX0" fmla="*/ 0 w 3474720"/>
-              <a:gd name="connsiteY0" fmla="*/ 0 h 18288"/>
-              <a:gd name="connsiteX1" fmla="*/ 694944 w 3474720"/>
-              <a:gd name="connsiteY1" fmla="*/ 0 h 18288"/>
-              <a:gd name="connsiteX2" fmla="*/ 1355141 w 3474720"/>
-              <a:gd name="connsiteY2" fmla="*/ 0 h 18288"/>
-              <a:gd name="connsiteX3" fmla="*/ 2015338 w 3474720"/>
-              <a:gd name="connsiteY3" fmla="*/ 0 h 18288"/>
-              <a:gd name="connsiteX4" fmla="*/ 2779776 w 3474720"/>
-              <a:gd name="connsiteY4" fmla="*/ 0 h 18288"/>
-              <a:gd name="connsiteX5" fmla="*/ 3474720 w 3474720"/>
-              <a:gd name="connsiteY5" fmla="*/ 0 h 18288"/>
-              <a:gd name="connsiteX6" fmla="*/ 3474720 w 3474720"/>
-              <a:gd name="connsiteY6" fmla="*/ 18288 h 18288"/>
-              <a:gd name="connsiteX7" fmla="*/ 2779776 w 3474720"/>
-              <a:gd name="connsiteY7" fmla="*/ 18288 h 18288"/>
-              <a:gd name="connsiteX8" fmla="*/ 2189074 w 3474720"/>
-              <a:gd name="connsiteY8" fmla="*/ 18288 h 18288"/>
-              <a:gd name="connsiteX9" fmla="*/ 1528877 w 3474720"/>
-              <a:gd name="connsiteY9" fmla="*/ 18288 h 18288"/>
-              <a:gd name="connsiteX10" fmla="*/ 868680 w 3474720"/>
-              <a:gd name="connsiteY10" fmla="*/ 18288 h 18288"/>
-              <a:gd name="connsiteX11" fmla="*/ 0 w 3474720"/>
-              <a:gd name="connsiteY11" fmla="*/ 18288 h 18288"/>
-              <a:gd name="connsiteX12" fmla="*/ 0 w 3474720"/>
-              <a:gd name="connsiteY12" fmla="*/ 0 h 18288"/>
-            </a:gdLst>
-            <a:ahLst/>
-            <a:cxnLst>
-              <a:cxn ang="0">
-                <a:pos x="connsiteX0" y="connsiteY0"/>
-              </a:cxn>
-              <a:cxn ang="0">
-                <a:pos x="connsiteX1" y="connsiteY1"/>
-              </a:cxn>
-              <a:cxn ang="0">
-                <a:pos x="connsiteX2" y="connsiteY2"/>
-              </a:cxn>
-              <a:cxn ang="0">
-                <a:pos x="connsiteX3" y="connsiteY3"/>
-              </a:cxn>
-              <a:cxn ang="0">
-                <a:pos x="connsiteX4" y="connsiteY4"/>
-              </a:cxn>
-              <a:cxn ang="0">
-                <a:pos x="connsiteX5" y="connsiteY5"/>
-              </a:cxn>
-              <a:cxn ang="0">
-                <a:pos x="connsiteX6" y="connsiteY6"/>
-              </a:cxn>
-              <a:cxn ang="0">
-                <a:pos x="connsiteX7" y="connsiteY7"/>
-              </a:cxn>
-              <a:cxn ang="0">
-                <a:pos x="connsiteX8" y="connsiteY8"/>
-              </a:cxn>
-              <a:cxn ang="0">
-                <a:pos x="connsiteX9" y="connsiteY9"/>
-              </a:cxn>
-              <a:cxn ang="0">
-                <a:pos x="connsiteX10" y="connsiteY10"/>
-              </a:cxn>
-              <a:cxn ang="0">
-                <a:pos x="connsiteX11" y="connsiteY11"/>
-              </a:cxn>
-              <a:cxn ang="0">
-                <a:pos x="connsiteX12" y="connsiteY12"/>
-              </a:cxn>
-            </a:cxnLst>
-            <a:rect l="l" t="t" r="r" b="b"/>
-            <a:pathLst>
-              <a:path w="3474720" h="18288" fill="none" extrusionOk="0">
-                <a:moveTo>
-                  <a:pt x="0" y="0"/>
-                </a:moveTo>
-                <a:cubicBezTo>
-                  <a:pt x="224454" y="-14544"/>
-                  <a:pt x="495407" y="26540"/>
-                  <a:pt x="694944" y="0"/>
-                </a:cubicBezTo>
-                <a:cubicBezTo>
-                  <a:pt x="894481" y="-26540"/>
-                  <a:pt x="1130063" y="24713"/>
-                  <a:pt x="1355141" y="0"/>
-                </a:cubicBezTo>
-                <a:cubicBezTo>
-                  <a:pt x="1580219" y="-24713"/>
-                  <a:pt x="1820099" y="26695"/>
-                  <a:pt x="2015338" y="0"/>
-                </a:cubicBezTo>
-                <a:cubicBezTo>
-                  <a:pt x="2210577" y="-26695"/>
-                  <a:pt x="2402045" y="165"/>
-                  <a:pt x="2779776" y="0"/>
-                </a:cubicBezTo>
-                <a:cubicBezTo>
-                  <a:pt x="3157507" y="-165"/>
-                  <a:pt x="3286859" y="-15571"/>
-                  <a:pt x="3474720" y="0"/>
-                </a:cubicBezTo>
-                <a:cubicBezTo>
-                  <a:pt x="3474286" y="7551"/>
-                  <a:pt x="3474253" y="9822"/>
-                  <a:pt x="3474720" y="18288"/>
-                </a:cubicBezTo>
-                <a:cubicBezTo>
-                  <a:pt x="3233904" y="29845"/>
-                  <a:pt x="2945134" y="-5256"/>
-                  <a:pt x="2779776" y="18288"/>
-                </a:cubicBezTo>
-                <a:cubicBezTo>
-                  <a:pt x="2614418" y="41832"/>
-                  <a:pt x="2339768" y="22709"/>
-                  <a:pt x="2189074" y="18288"/>
-                </a:cubicBezTo>
-                <a:cubicBezTo>
-                  <a:pt x="2038380" y="13867"/>
-                  <a:pt x="1817434" y="-4947"/>
-                  <a:pt x="1528877" y="18288"/>
-                </a:cubicBezTo>
-                <a:cubicBezTo>
-                  <a:pt x="1240320" y="41523"/>
-                  <a:pt x="1042447" y="37198"/>
-                  <a:pt x="868680" y="18288"/>
-                </a:cubicBezTo>
-                <a:cubicBezTo>
-                  <a:pt x="694913" y="-622"/>
-                  <a:pt x="233232" y="44909"/>
-                  <a:pt x="0" y="18288"/>
-                </a:cubicBezTo>
-                <a:cubicBezTo>
-                  <a:pt x="60" y="11696"/>
-                  <a:pt x="66" y="3758"/>
-                  <a:pt x="0" y="0"/>
-                </a:cubicBezTo>
-                <a:close/>
-              </a:path>
-              <a:path w="3474720" h="18288" stroke="0" extrusionOk="0">
-                <a:moveTo>
-                  <a:pt x="0" y="0"/>
-                </a:moveTo>
-                <a:cubicBezTo>
-                  <a:pt x="202328" y="-14716"/>
-                  <a:pt x="332722" y="-11499"/>
-                  <a:pt x="625450" y="0"/>
-                </a:cubicBezTo>
-                <a:cubicBezTo>
-                  <a:pt x="918178" y="11499"/>
-                  <a:pt x="1096688" y="5123"/>
-                  <a:pt x="1389888" y="0"/>
-                </a:cubicBezTo>
-                <a:cubicBezTo>
-                  <a:pt x="1683088" y="-5123"/>
-                  <a:pt x="1835981" y="-14038"/>
-                  <a:pt x="1980590" y="0"/>
-                </a:cubicBezTo>
-                <a:cubicBezTo>
-                  <a:pt x="2125199" y="14038"/>
-                  <a:pt x="2396099" y="-7203"/>
-                  <a:pt x="2571293" y="0"/>
-                </a:cubicBezTo>
-                <a:cubicBezTo>
-                  <a:pt x="2746487" y="7203"/>
-                  <a:pt x="3041609" y="-12036"/>
-                  <a:pt x="3474720" y="0"/>
-                </a:cubicBezTo>
-                <a:cubicBezTo>
-                  <a:pt x="3474638" y="4406"/>
-                  <a:pt x="3474631" y="9982"/>
-                  <a:pt x="3474720" y="18288"/>
-                </a:cubicBezTo>
-                <a:cubicBezTo>
-                  <a:pt x="3324873" y="21876"/>
-                  <a:pt x="3136771" y="12587"/>
-                  <a:pt x="2814523" y="18288"/>
-                </a:cubicBezTo>
-                <a:cubicBezTo>
-                  <a:pt x="2492275" y="23989"/>
-                  <a:pt x="2294402" y="47111"/>
-                  <a:pt x="2154326" y="18288"/>
-                </a:cubicBezTo>
-                <a:cubicBezTo>
-                  <a:pt x="2014250" y="-10535"/>
-                  <a:pt x="1820317" y="33903"/>
-                  <a:pt x="1494130" y="18288"/>
-                </a:cubicBezTo>
-                <a:cubicBezTo>
-                  <a:pt x="1167943" y="2673"/>
-                  <a:pt x="948432" y="14868"/>
-                  <a:pt x="729691" y="18288"/>
-                </a:cubicBezTo>
-                <a:cubicBezTo>
-                  <a:pt x="510950" y="21708"/>
-                  <a:pt x="264032" y="24354"/>
-                  <a:pt x="0" y="18288"/>
-                </a:cubicBezTo>
-                <a:cubicBezTo>
-                  <a:pt x="189" y="14288"/>
-                  <a:pt x="-703" y="3747"/>
-                  <a:pt x="0" y="0"/>
-                </a:cubicBezTo>
-                <a:close/>
-              </a:path>
-            </a:pathLst>
-          </a:custGeom>
-          <a:solidFill>
-            <a:schemeClr val="accent2"/>
-          </a:solidFill>
-          <a:ln w="44450" cap="rnd">
-            <a:solidFill>
-              <a:schemeClr val="accent2"/>
-            </a:solidFill>
-            <a:round/>
-            <a:extLst>
-              <a:ext uri="{C807C97D-BFC1-408E-A445-0C87EB9F89A2}">
-                <ask:lineSketchStyleProps xmlns:ask="http://schemas.microsoft.com/office/drawing/2018/sketchyshapes" sd="2863741219">
-                  <a:prstGeom prst="rect">
-                    <a:avLst/>
-                  </a:prstGeom>
-                  <ask:type>
-                    <ask:lineSketchFreehand/>
-                  </ask:type>
-                </ask:lineSketchStyleProps>
-              </a:ext>
-            </a:extLst>
-          </a:ln>
-        </p:spPr>
-        <p:style>
-          <a:lnRef idx="2">
-            <a:schemeClr val="accent1">
-              <a:shade val="50000"/>
-            </a:schemeClr>
-          </a:lnRef>
-          <a:fillRef idx="1">
-            <a:schemeClr val="accent1"/>
-          </a:fillRef>
-          <a:effectRef idx="0">
-            <a:schemeClr val="accent1"/>
-          </a:effectRef>
-          <a:fontRef idx="minor">
-            <a:schemeClr val="lt1"/>
-          </a:fontRef>
-        </p:style>
-        <p:txBody>
-          <a:bodyPr rtlCol="0" anchor="ctr"/>
-          <a:lstStyle/>
-          <a:p>
-            <a:pPr algn="ctr"/>
-            <a:endParaRPr lang="en-US"/>
-          </a:p>
-        </p:txBody>
-      </p:sp>
-      <p:sp>
-        <p:nvSpPr>
-          <p:cNvPr id="3" name="Content Placeholder 2">
-            <a:extLst>
-              <a:ext uri="{FF2B5EF4-FFF2-40B4-BE49-F238E27FC236}">
-                <a16:creationId xmlns:a16="http://schemas.microsoft.com/office/drawing/2014/main" id="{247882B2-0D23-323E-A5F8-AD206D3F2E04}"/>
-              </a:ext>
-            </a:extLst>
-          </p:cNvPr>
-          <p:cNvSpPr>
-            <a:spLocks noGrp="1"/>
-          </p:cNvSpPr>
-          <p:nvPr>
-            <p:ph idx="1"/>
-          </p:nvPr>
-        </p:nvSpPr>
-        <p:spPr>
-          <a:xfrm>
-            <a:off x="640080" y="2872899"/>
-            <a:ext cx="4243589" cy="3320668"/>
-          </a:xfrm>
-        </p:spPr>
-        <p:txBody>
-          <a:bodyPr>
-            <a:normAutofit/>
-          </a:bodyPr>
-          <a:lstStyle/>
-          <a:p>
-            <a:pPr>
-              <a:buFont typeface="Wingdings" pitchFamily="2" charset="2"/>
-              <a:buChar char="q"/>
-            </a:pPr>
-            <a:r>
-              <a:rPr lang="en-US" sz="2200"/>
-              <a:t>The ticket price has room for increasing and the revenues can be increased by facilities improvement. </a:t>
-            </a:r>
-          </a:p>
-          <a:p>
-            <a:pPr>
-              <a:buFont typeface="Wingdings" pitchFamily="2" charset="2"/>
-              <a:buChar char="q"/>
-            </a:pPr>
-            <a:r>
-              <a:rPr lang="en-US" sz="2200"/>
-              <a:t>The primary goal of this object is achieved. </a:t>
-            </a:r>
-          </a:p>
-        </p:txBody>
-      </p:sp>
-      <p:pic>
-        <p:nvPicPr>
-          <p:cNvPr id="5" name="Picture 4" descr="Graph">
-            <a:extLst>
-              <a:ext uri="{FF2B5EF4-FFF2-40B4-BE49-F238E27FC236}">
-                <a16:creationId xmlns:a16="http://schemas.microsoft.com/office/drawing/2014/main" id="{1C2896E6-FE74-B348-11CB-78C9DAA08CC1}"/>
-              </a:ext>
-            </a:extLst>
-          </p:cNvPr>
-          <p:cNvPicPr>
-            <a:picLocks noChangeAspect="1"/>
-          </p:cNvPicPr>
-          <p:nvPr/>
-        </p:nvPicPr>
-        <p:blipFill rotWithShape="1">
-          <a:blip r:embed="rId2"/>
-          <a:srcRect l="13022" r="24288"/>
-          <a:stretch/>
-        </p:blipFill>
-        <p:spPr>
-          <a:xfrm>
-            <a:off x="5311702" y="10"/>
-            <a:ext cx="6878775" cy="6857990"/>
-          </a:xfrm>
-          <a:custGeom>
-            <a:avLst/>
-            <a:gdLst/>
-            <a:ahLst/>
-            <a:cxnLst/>
-            <a:rect l="l" t="t" r="r" b="b"/>
-            <a:pathLst>
-              <a:path w="6878775" h="6858000">
-                <a:moveTo>
-                  <a:pt x="1102973" y="0"/>
-                </a:moveTo>
-                <a:lnTo>
-                  <a:pt x="1160688" y="0"/>
-                </a:lnTo>
-                <a:lnTo>
-                  <a:pt x="983189" y="331786"/>
-                </a:lnTo>
-                <a:cubicBezTo>
-                  <a:pt x="914866" y="469145"/>
-                  <a:pt x="850355" y="608712"/>
-                  <a:pt x="789261" y="750263"/>
-                </a:cubicBezTo>
-                <a:cubicBezTo>
-                  <a:pt x="774307" y="784928"/>
-                  <a:pt x="759992" y="819849"/>
-                  <a:pt x="745295" y="854514"/>
-                </a:cubicBezTo>
-                <a:cubicBezTo>
-                  <a:pt x="756682" y="845393"/>
-                  <a:pt x="765489" y="833492"/>
-                  <a:pt x="770857" y="819975"/>
-                </a:cubicBezTo>
-                <a:cubicBezTo>
-                  <a:pt x="879943" y="589569"/>
-                  <a:pt x="999605" y="365513"/>
-                  <a:pt x="1131329" y="148742"/>
-                </a:cubicBezTo>
-                <a:lnTo>
-                  <a:pt x="1227589" y="0"/>
-                </a:lnTo>
-                <a:lnTo>
-                  <a:pt x="6878775" y="0"/>
-                </a:lnTo>
-                <a:lnTo>
-                  <a:pt x="6878775" y="6858000"/>
-                </a:lnTo>
-                <a:lnTo>
-                  <a:pt x="713521" y="6858000"/>
-                </a:lnTo>
-                <a:lnTo>
-                  <a:pt x="625642" y="6670527"/>
-                </a:lnTo>
-                <a:cubicBezTo>
-                  <a:pt x="507232" y="6398531"/>
-                  <a:pt x="403083" y="6118381"/>
-                  <a:pt x="312785" y="5830359"/>
-                </a:cubicBezTo>
-                <a:cubicBezTo>
-                  <a:pt x="278149" y="5719759"/>
-                  <a:pt x="248879" y="5607635"/>
-                  <a:pt x="212198" y="5480401"/>
-                </a:cubicBezTo>
-                <a:cubicBezTo>
-                  <a:pt x="212208" y="5491601"/>
-                  <a:pt x="212803" y="5502788"/>
-                  <a:pt x="213988" y="5513923"/>
-                </a:cubicBezTo>
-                <a:cubicBezTo>
-                  <a:pt x="264089" y="5723695"/>
-                  <a:pt x="307290" y="5935370"/>
-                  <a:pt x="365826" y="6142729"/>
-                </a:cubicBezTo>
-                <a:cubicBezTo>
-                  <a:pt x="433152" y="6380817"/>
-                  <a:pt x="510068" y="6614016"/>
-                  <a:pt x="597975" y="6841549"/>
-                </a:cubicBezTo>
-                <a:lnTo>
-                  <a:pt x="604824" y="6858000"/>
-                </a:lnTo>
-                <a:lnTo>
-                  <a:pt x="552056" y="6858000"/>
-                </a:lnTo>
-                <a:lnTo>
-                  <a:pt x="539576" y="6828295"/>
-                </a:lnTo>
-                <a:cubicBezTo>
-                  <a:pt x="380597" y="6414594"/>
-                  <a:pt x="260223" y="5988893"/>
-                  <a:pt x="171555" y="5552906"/>
-                </a:cubicBezTo>
-                <a:cubicBezTo>
-                  <a:pt x="91163" y="5157998"/>
-                  <a:pt x="43746" y="4758899"/>
-                  <a:pt x="12305" y="4357388"/>
-                </a:cubicBezTo>
-                <a:cubicBezTo>
-                  <a:pt x="-14281" y="4013908"/>
-                  <a:pt x="4507" y="3672965"/>
-                  <a:pt x="46684" y="3331516"/>
-                </a:cubicBezTo>
-                <a:cubicBezTo>
-                  <a:pt x="127203" y="2664286"/>
-                  <a:pt x="277819" y="2007265"/>
-                  <a:pt x="496065" y="1371196"/>
-                </a:cubicBezTo>
-                <a:cubicBezTo>
-                  <a:pt x="636273" y="966066"/>
-                  <a:pt x="800445" y="573253"/>
-                  <a:pt x="995723" y="196614"/>
-                </a:cubicBezTo>
-                <a:close/>
-              </a:path>
-            </a:pathLst>
-          </a:custGeom>
-        </p:spPr>
-      </p:pic>
-    </p:spTree>
-    <p:extLst>
-      <p:ext uri="{BB962C8B-B14F-4D97-AF65-F5344CB8AC3E}">
-        <p14:creationId xmlns:p14="http://schemas.microsoft.com/office/powerpoint/2010/main" val="2933237685"/>
-      </p:ext>
-    </p:extLst>
-  </p:cSld>
-  <p:clrMapOvr>
-    <a:masterClrMapping/>
-  </p:clrMapOvr>
-</p:sld>
-</file>
-
 <file path=ppt/slides/slide2.xml><?xml version="1.0" encoding="utf-8"?>
-<p:sld xmlns:a="http://schemas.openxmlformats.org/drawingml/2006/main" xmlns:r="http://schemas.openxmlformats.org/officeDocument/2006/relationships" xmlns:p="http://schemas.openxmlformats.org/presentationml/2006/main">
-  <p:cSld>
-    <p:bg>
-      <p:bgPr>
-        <a:solidFill>
-          <a:schemeClr val="bg1"/>
-        </a:solidFill>
-        <a:effectLst/>
-      </p:bgPr>
-    </p:bg>
-    <p:spTree>
-      <p:nvGrpSpPr>
-        <p:cNvPr id="1" name=""/>
-        <p:cNvGrpSpPr/>
-        <p:nvPr/>
-      </p:nvGrpSpPr>
-      <p:grpSpPr>
-        <a:xfrm>
-          <a:off x="0" y="0"/>
-          <a:ext cx="0" cy="0"/>
-          <a:chOff x="0" y="0"/>
-          <a:chExt cx="0" cy="0"/>
-        </a:xfrm>
-      </p:grpSpPr>
-      <p:sp>
-        <p:nvSpPr>
-          <p:cNvPr id="2" name="Title 1">
-            <a:extLst>
-              <a:ext uri="{FF2B5EF4-FFF2-40B4-BE49-F238E27FC236}">
-                <a16:creationId xmlns:a16="http://schemas.microsoft.com/office/drawing/2014/main" id="{DF1D4BE3-61EE-47E5-53C8-8B4D319D06F2}"/>
-              </a:ext>
-            </a:extLst>
-          </p:cNvPr>
-          <p:cNvSpPr>
-            <a:spLocks noGrp="1"/>
-          </p:cNvSpPr>
-          <p:nvPr>
-            <p:ph type="ctrTitle"/>
-          </p:nvPr>
-        </p:nvSpPr>
-        <p:spPr>
-          <a:xfrm>
-            <a:off x="6590662" y="4267832"/>
-            <a:ext cx="4805996" cy="1297115"/>
-          </a:xfrm>
-        </p:spPr>
-        <p:txBody>
-          <a:bodyPr anchor="t">
-            <a:normAutofit/>
-          </a:bodyPr>
-          <a:lstStyle/>
-          <a:p>
-            <a:pPr algn="l"/>
-            <a:r>
-              <a:rPr lang="en-US" sz="2800" b="0" i="0">
-                <a:solidFill>
-                  <a:schemeClr val="tx2"/>
-                </a:solidFill>
-                <a:effectLst/>
-                <a:latin typeface="+mn-lt"/>
-                <a:cs typeface="Arial" panose="020B0604020202020204" pitchFamily="34" charset="0"/>
-              </a:rPr>
-              <a:t>Big Mountain Resort Project</a:t>
-            </a:r>
-            <a:br>
-              <a:rPr lang="en-US" sz="2800" b="0" i="0">
-                <a:solidFill>
-                  <a:schemeClr val="tx2"/>
-                </a:solidFill>
-                <a:effectLst/>
-                <a:latin typeface="+mn-lt"/>
-                <a:cs typeface="Arial" panose="020B0604020202020204" pitchFamily="34" charset="0"/>
-              </a:rPr>
-            </a:br>
-            <a:r>
-              <a:rPr lang="en-US" sz="2800" b="0" i="0">
-                <a:solidFill>
-                  <a:schemeClr val="tx2"/>
-                </a:solidFill>
-                <a:effectLst/>
-                <a:latin typeface="+mn-lt"/>
-                <a:cs typeface="Arial" panose="020B0604020202020204" pitchFamily="34" charset="0"/>
-              </a:rPr>
-              <a:t>Presenter: Hui Zhang</a:t>
-            </a:r>
-            <a:br>
-              <a:rPr lang="en-US" sz="2800" b="0" i="0">
-                <a:solidFill>
-                  <a:schemeClr val="tx2"/>
-                </a:solidFill>
-                <a:effectLst/>
-                <a:latin typeface="+mn-lt"/>
-                <a:cs typeface="Arial" panose="020B0604020202020204" pitchFamily="34" charset="0"/>
-              </a:rPr>
-            </a:br>
-            <a:r>
-              <a:rPr lang="en-US" sz="2800" b="0" i="0">
-                <a:solidFill>
-                  <a:schemeClr val="tx2"/>
-                </a:solidFill>
-                <a:effectLst/>
-                <a:latin typeface="+mn-lt"/>
-                <a:cs typeface="Arial" panose="020B0604020202020204" pitchFamily="34" charset="0"/>
-              </a:rPr>
-              <a:t>Date: August 08,2023</a:t>
-            </a:r>
-            <a:endParaRPr lang="en-US" sz="2800">
-              <a:solidFill>
-                <a:schemeClr val="tx2"/>
-              </a:solidFill>
-              <a:latin typeface="+mn-lt"/>
-              <a:cs typeface="Arial" panose="020B0604020202020204" pitchFamily="34" charset="0"/>
-            </a:endParaRPr>
-          </a:p>
-        </p:txBody>
-      </p:sp>
-      <p:pic>
-        <p:nvPicPr>
-          <p:cNvPr id="6" name="Graphic 5" descr="Mountains">
-            <a:extLst>
-              <a:ext uri="{FF2B5EF4-FFF2-40B4-BE49-F238E27FC236}">
-                <a16:creationId xmlns:a16="http://schemas.microsoft.com/office/drawing/2014/main" id="{2C4AED66-2E7C-C1F2-0A96-AE6604270F9C}"/>
-              </a:ext>
-            </a:extLst>
-          </p:cNvPr>
-          <p:cNvPicPr>
-            <a:picLocks noChangeAspect="1"/>
-          </p:cNvPicPr>
-          <p:nvPr/>
-        </p:nvPicPr>
-        <p:blipFill>
-          <a:blip r:embed="rId3">
-            <a:extLst>
-              <a:ext uri="{28A0092B-C50C-407E-A947-70E740481C1C}">
-                <a14:useLocalDpi xmlns:a14="http://schemas.microsoft.com/office/drawing/2010/main" val="0"/>
-              </a:ext>
-              <a:ext uri="{96DAC541-7B7A-43D3-8B79-37D633B846F1}">
-                <asvg:svgBlip xmlns:asvg="http://schemas.microsoft.com/office/drawing/2016/SVG/main" r:embed="rId4"/>
-              </a:ext>
-            </a:extLst>
-          </a:blip>
-          <a:stretch>
-            <a:fillRect/>
-          </a:stretch>
-        </p:blipFill>
-        <p:spPr>
-          <a:xfrm>
-            <a:off x="340470" y="1815320"/>
-            <a:ext cx="4141760" cy="4141760"/>
-          </a:xfrm>
-          <a:custGeom>
-            <a:avLst/>
-            <a:gdLst/>
-            <a:ahLst/>
-            <a:cxnLst/>
-            <a:rect l="l" t="t" r="r" b="b"/>
-            <a:pathLst>
-              <a:path w="4141760" h="4377846">
-                <a:moveTo>
-                  <a:pt x="0" y="0"/>
-                </a:moveTo>
-                <a:lnTo>
-                  <a:pt x="4141760" y="0"/>
-                </a:lnTo>
-                <a:lnTo>
-                  <a:pt x="4141760" y="4377846"/>
-                </a:lnTo>
-                <a:lnTo>
-                  <a:pt x="0" y="4377846"/>
-                </a:lnTo>
-                <a:close/>
-              </a:path>
-            </a:pathLst>
-          </a:custGeom>
-        </p:spPr>
-      </p:pic>
-    </p:spTree>
-    <p:extLst>
-      <p:ext uri="{BB962C8B-B14F-4D97-AF65-F5344CB8AC3E}">
-        <p14:creationId xmlns:p14="http://schemas.microsoft.com/office/powerpoint/2010/main" val="1258329866"/>
-      </p:ext>
-    </p:extLst>
-  </p:cSld>
-  <p:clrMapOvr>
-    <a:masterClrMapping/>
-  </p:clrMapOvr>
-</p:sld>
-</file>
-
-<file path=ppt/slides/slide3.xml><?xml version="1.0" encoding="utf-8"?>
 <p:sld xmlns:a="http://schemas.openxmlformats.org/drawingml/2006/main" xmlns:r="http://schemas.openxmlformats.org/officeDocument/2006/relationships" xmlns:p="http://schemas.openxmlformats.org/presentationml/2006/main">
   <p:cSld>
     <p:bg>
@@ -5810,761 +4574,7 @@
 </p:sld>
 </file>
 
-<file path=ppt/slides/slide4.xml><?xml version="1.0" encoding="utf-8"?>
-<p:sld xmlns:a="http://schemas.openxmlformats.org/drawingml/2006/main" xmlns:r="http://schemas.openxmlformats.org/officeDocument/2006/relationships" xmlns:p="http://schemas.openxmlformats.org/presentationml/2006/main">
-  <p:cSld>
-    <p:bg>
-      <p:bgPr>
-        <a:solidFill>
-          <a:schemeClr val="bg1"/>
-        </a:solidFill>
-        <a:effectLst/>
-      </p:bgPr>
-    </p:bg>
-    <p:spTree>
-      <p:nvGrpSpPr>
-        <p:cNvPr id="1" name=""/>
-        <p:cNvGrpSpPr/>
-        <p:nvPr/>
-      </p:nvGrpSpPr>
-      <p:grpSpPr>
-        <a:xfrm>
-          <a:off x="0" y="0"/>
-          <a:ext cx="0" cy="0"/>
-          <a:chOff x="0" y="0"/>
-          <a:chExt cx="0" cy="0"/>
-        </a:xfrm>
-      </p:grpSpPr>
-      <p:sp useBgFill="1">
-        <p:nvSpPr>
-          <p:cNvPr id="11" name="Rectangle 10">
-            <a:extLst>
-              <a:ext uri="{FF2B5EF4-FFF2-40B4-BE49-F238E27FC236}">
-                <a16:creationId xmlns:a16="http://schemas.microsoft.com/office/drawing/2014/main" id="{F13C74B1-5B17-4795-BED0-7140497B445A}"/>
-              </a:ext>
-              <a:ext uri="{C183D7F6-B498-43B3-948B-1728B52AA6E4}">
-                <adec:decorative xmlns:adec="http://schemas.microsoft.com/office/drawing/2017/decorative" val="1"/>
-              </a:ext>
-            </a:extLst>
-          </p:cNvPr>
-          <p:cNvSpPr>
-            <a:spLocks noGrp="1" noRot="1" noChangeAspect="1" noMove="1" noResize="1" noEditPoints="1" noAdjustHandles="1" noChangeArrowheads="1" noChangeShapeType="1" noTextEdit="1"/>
-          </p:cNvSpPr>
-          <p:nvPr>
-            <p:extLst>
-              <p:ext uri="{386F3935-93C4-4BCD-93E2-E3B085C9AB24}">
-                <p16:designElem xmlns:p16="http://schemas.microsoft.com/office/powerpoint/2015/main" val="1"/>
-              </p:ext>
-            </p:extLst>
-          </p:nvPr>
-        </p:nvSpPr>
-        <p:spPr>
-          <a:xfrm>
-            <a:off x="0" y="0"/>
-            <a:ext cx="12188952" cy="6858000"/>
-          </a:xfrm>
-          <a:prstGeom prst="rect">
-            <a:avLst/>
-          </a:prstGeom>
-          <a:ln>
-            <a:noFill/>
-          </a:ln>
-        </p:spPr>
-        <p:style>
-          <a:lnRef idx="2">
-            <a:schemeClr val="accent1">
-              <a:shade val="50000"/>
-            </a:schemeClr>
-          </a:lnRef>
-          <a:fillRef idx="1">
-            <a:schemeClr val="accent1"/>
-          </a:fillRef>
-          <a:effectRef idx="0">
-            <a:schemeClr val="accent1"/>
-          </a:effectRef>
-          <a:fontRef idx="minor">
-            <a:schemeClr val="lt1"/>
-          </a:fontRef>
-        </p:style>
-        <p:txBody>
-          <a:bodyPr rtlCol="0" anchor="ctr"/>
-          <a:lstStyle/>
-          <a:p>
-            <a:pPr algn="ctr"/>
-            <a:endParaRPr lang="en-US"/>
-          </a:p>
-        </p:txBody>
-      </p:sp>
-      <p:sp>
-        <p:nvSpPr>
-          <p:cNvPr id="2" name="Title 1">
-            <a:extLst>
-              <a:ext uri="{FF2B5EF4-FFF2-40B4-BE49-F238E27FC236}">
-                <a16:creationId xmlns:a16="http://schemas.microsoft.com/office/drawing/2014/main" id="{8AB6C3E7-43BD-A57F-8473-EBDBB58339F0}"/>
-              </a:ext>
-            </a:extLst>
-          </p:cNvPr>
-          <p:cNvSpPr>
-            <a:spLocks noGrp="1"/>
-          </p:cNvSpPr>
-          <p:nvPr>
-            <p:ph type="title"/>
-          </p:nvPr>
-        </p:nvSpPr>
-        <p:spPr>
-          <a:xfrm>
-            <a:off x="640080" y="325369"/>
-            <a:ext cx="4368602" cy="1956841"/>
-          </a:xfrm>
-        </p:spPr>
-        <p:txBody>
-          <a:bodyPr anchor="b">
-            <a:normAutofit/>
-          </a:bodyPr>
-          <a:lstStyle/>
-          <a:p>
-            <a:r>
-              <a:rPr lang="en-US" sz="5400" b="0" i="0" dirty="0">
-                <a:effectLst/>
-                <a:latin typeface="+mn-lt"/>
-                <a:cs typeface="Arial" panose="020B0604020202020204" pitchFamily="34" charset="0"/>
-              </a:rPr>
-              <a:t>Project Goals:</a:t>
-            </a:r>
-            <a:endParaRPr lang="en-US" sz="5400" dirty="0">
-              <a:latin typeface="+mn-lt"/>
-              <a:cs typeface="Arial" panose="020B0604020202020204" pitchFamily="34" charset="0"/>
-            </a:endParaRPr>
-          </a:p>
-        </p:txBody>
-      </p:sp>
-      <p:sp>
-        <p:nvSpPr>
-          <p:cNvPr id="13" name="sketchy line">
-            <a:extLst>
-              <a:ext uri="{FF2B5EF4-FFF2-40B4-BE49-F238E27FC236}">
-                <a16:creationId xmlns:a16="http://schemas.microsoft.com/office/drawing/2014/main" id="{D4974D33-8DC5-464E-8C6D-BE58F0669C17}"/>
-              </a:ext>
-              <a:ext uri="{C183D7F6-B498-43B3-948B-1728B52AA6E4}">
-                <adec:decorative xmlns:adec="http://schemas.microsoft.com/office/drawing/2017/decorative" val="1"/>
-              </a:ext>
-            </a:extLst>
-          </p:cNvPr>
-          <p:cNvSpPr>
-            <a:spLocks noGrp="1" noRot="1" noChangeAspect="1" noMove="1" noResize="1" noEditPoints="1" noAdjustHandles="1" noChangeArrowheads="1" noChangeShapeType="1" noTextEdit="1"/>
-          </p:cNvSpPr>
-          <p:nvPr>
-            <p:extLst>
-              <p:ext uri="{386F3935-93C4-4BCD-93E2-E3B085C9AB24}">
-                <p16:designElem xmlns:p16="http://schemas.microsoft.com/office/powerpoint/2015/main" val="1"/>
-              </p:ext>
-            </p:extLst>
-          </p:nvPr>
-        </p:nvSpPr>
-        <p:spPr>
-          <a:xfrm>
-            <a:off x="640080" y="2586994"/>
-            <a:ext cx="3474720" cy="18288"/>
-          </a:xfrm>
-          <a:custGeom>
-            <a:avLst/>
-            <a:gdLst>
-              <a:gd name="connsiteX0" fmla="*/ 0 w 3474720"/>
-              <a:gd name="connsiteY0" fmla="*/ 0 h 18288"/>
-              <a:gd name="connsiteX1" fmla="*/ 694944 w 3474720"/>
-              <a:gd name="connsiteY1" fmla="*/ 0 h 18288"/>
-              <a:gd name="connsiteX2" fmla="*/ 1355141 w 3474720"/>
-              <a:gd name="connsiteY2" fmla="*/ 0 h 18288"/>
-              <a:gd name="connsiteX3" fmla="*/ 2015338 w 3474720"/>
-              <a:gd name="connsiteY3" fmla="*/ 0 h 18288"/>
-              <a:gd name="connsiteX4" fmla="*/ 2779776 w 3474720"/>
-              <a:gd name="connsiteY4" fmla="*/ 0 h 18288"/>
-              <a:gd name="connsiteX5" fmla="*/ 3474720 w 3474720"/>
-              <a:gd name="connsiteY5" fmla="*/ 0 h 18288"/>
-              <a:gd name="connsiteX6" fmla="*/ 3474720 w 3474720"/>
-              <a:gd name="connsiteY6" fmla="*/ 18288 h 18288"/>
-              <a:gd name="connsiteX7" fmla="*/ 2779776 w 3474720"/>
-              <a:gd name="connsiteY7" fmla="*/ 18288 h 18288"/>
-              <a:gd name="connsiteX8" fmla="*/ 2189074 w 3474720"/>
-              <a:gd name="connsiteY8" fmla="*/ 18288 h 18288"/>
-              <a:gd name="connsiteX9" fmla="*/ 1528877 w 3474720"/>
-              <a:gd name="connsiteY9" fmla="*/ 18288 h 18288"/>
-              <a:gd name="connsiteX10" fmla="*/ 868680 w 3474720"/>
-              <a:gd name="connsiteY10" fmla="*/ 18288 h 18288"/>
-              <a:gd name="connsiteX11" fmla="*/ 0 w 3474720"/>
-              <a:gd name="connsiteY11" fmla="*/ 18288 h 18288"/>
-              <a:gd name="connsiteX12" fmla="*/ 0 w 3474720"/>
-              <a:gd name="connsiteY12" fmla="*/ 0 h 18288"/>
-            </a:gdLst>
-            <a:ahLst/>
-            <a:cxnLst>
-              <a:cxn ang="0">
-                <a:pos x="connsiteX0" y="connsiteY0"/>
-              </a:cxn>
-              <a:cxn ang="0">
-                <a:pos x="connsiteX1" y="connsiteY1"/>
-              </a:cxn>
-              <a:cxn ang="0">
-                <a:pos x="connsiteX2" y="connsiteY2"/>
-              </a:cxn>
-              <a:cxn ang="0">
-                <a:pos x="connsiteX3" y="connsiteY3"/>
-              </a:cxn>
-              <a:cxn ang="0">
-                <a:pos x="connsiteX4" y="connsiteY4"/>
-              </a:cxn>
-              <a:cxn ang="0">
-                <a:pos x="connsiteX5" y="connsiteY5"/>
-              </a:cxn>
-              <a:cxn ang="0">
-                <a:pos x="connsiteX6" y="connsiteY6"/>
-              </a:cxn>
-              <a:cxn ang="0">
-                <a:pos x="connsiteX7" y="connsiteY7"/>
-              </a:cxn>
-              <a:cxn ang="0">
-                <a:pos x="connsiteX8" y="connsiteY8"/>
-              </a:cxn>
-              <a:cxn ang="0">
-                <a:pos x="connsiteX9" y="connsiteY9"/>
-              </a:cxn>
-              <a:cxn ang="0">
-                <a:pos x="connsiteX10" y="connsiteY10"/>
-              </a:cxn>
-              <a:cxn ang="0">
-                <a:pos x="connsiteX11" y="connsiteY11"/>
-              </a:cxn>
-              <a:cxn ang="0">
-                <a:pos x="connsiteX12" y="connsiteY12"/>
-              </a:cxn>
-            </a:cxnLst>
-            <a:rect l="l" t="t" r="r" b="b"/>
-            <a:pathLst>
-              <a:path w="3474720" h="18288" fill="none" extrusionOk="0">
-                <a:moveTo>
-                  <a:pt x="0" y="0"/>
-                </a:moveTo>
-                <a:cubicBezTo>
-                  <a:pt x="224454" y="-14544"/>
-                  <a:pt x="495407" y="26540"/>
-                  <a:pt x="694944" y="0"/>
-                </a:cubicBezTo>
-                <a:cubicBezTo>
-                  <a:pt x="894481" y="-26540"/>
-                  <a:pt x="1130063" y="24713"/>
-                  <a:pt x="1355141" y="0"/>
-                </a:cubicBezTo>
-                <a:cubicBezTo>
-                  <a:pt x="1580219" y="-24713"/>
-                  <a:pt x="1820099" y="26695"/>
-                  <a:pt x="2015338" y="0"/>
-                </a:cubicBezTo>
-                <a:cubicBezTo>
-                  <a:pt x="2210577" y="-26695"/>
-                  <a:pt x="2402045" y="165"/>
-                  <a:pt x="2779776" y="0"/>
-                </a:cubicBezTo>
-                <a:cubicBezTo>
-                  <a:pt x="3157507" y="-165"/>
-                  <a:pt x="3286859" y="-15571"/>
-                  <a:pt x="3474720" y="0"/>
-                </a:cubicBezTo>
-                <a:cubicBezTo>
-                  <a:pt x="3474286" y="7551"/>
-                  <a:pt x="3474253" y="9822"/>
-                  <a:pt x="3474720" y="18288"/>
-                </a:cubicBezTo>
-                <a:cubicBezTo>
-                  <a:pt x="3233904" y="29845"/>
-                  <a:pt x="2945134" y="-5256"/>
-                  <a:pt x="2779776" y="18288"/>
-                </a:cubicBezTo>
-                <a:cubicBezTo>
-                  <a:pt x="2614418" y="41832"/>
-                  <a:pt x="2339768" y="22709"/>
-                  <a:pt x="2189074" y="18288"/>
-                </a:cubicBezTo>
-                <a:cubicBezTo>
-                  <a:pt x="2038380" y="13867"/>
-                  <a:pt x="1817434" y="-4947"/>
-                  <a:pt x="1528877" y="18288"/>
-                </a:cubicBezTo>
-                <a:cubicBezTo>
-                  <a:pt x="1240320" y="41523"/>
-                  <a:pt x="1042447" y="37198"/>
-                  <a:pt x="868680" y="18288"/>
-                </a:cubicBezTo>
-                <a:cubicBezTo>
-                  <a:pt x="694913" y="-622"/>
-                  <a:pt x="233232" y="44909"/>
-                  <a:pt x="0" y="18288"/>
-                </a:cubicBezTo>
-                <a:cubicBezTo>
-                  <a:pt x="60" y="11696"/>
-                  <a:pt x="66" y="3758"/>
-                  <a:pt x="0" y="0"/>
-                </a:cubicBezTo>
-                <a:close/>
-              </a:path>
-              <a:path w="3474720" h="18288" stroke="0" extrusionOk="0">
-                <a:moveTo>
-                  <a:pt x="0" y="0"/>
-                </a:moveTo>
-                <a:cubicBezTo>
-                  <a:pt x="202328" y="-14716"/>
-                  <a:pt x="332722" y="-11499"/>
-                  <a:pt x="625450" y="0"/>
-                </a:cubicBezTo>
-                <a:cubicBezTo>
-                  <a:pt x="918178" y="11499"/>
-                  <a:pt x="1096688" y="5123"/>
-                  <a:pt x="1389888" y="0"/>
-                </a:cubicBezTo>
-                <a:cubicBezTo>
-                  <a:pt x="1683088" y="-5123"/>
-                  <a:pt x="1835981" y="-14038"/>
-                  <a:pt x="1980590" y="0"/>
-                </a:cubicBezTo>
-                <a:cubicBezTo>
-                  <a:pt x="2125199" y="14038"/>
-                  <a:pt x="2396099" y="-7203"/>
-                  <a:pt x="2571293" y="0"/>
-                </a:cubicBezTo>
-                <a:cubicBezTo>
-                  <a:pt x="2746487" y="7203"/>
-                  <a:pt x="3041609" y="-12036"/>
-                  <a:pt x="3474720" y="0"/>
-                </a:cubicBezTo>
-                <a:cubicBezTo>
-                  <a:pt x="3474638" y="4406"/>
-                  <a:pt x="3474631" y="9982"/>
-                  <a:pt x="3474720" y="18288"/>
-                </a:cubicBezTo>
-                <a:cubicBezTo>
-                  <a:pt x="3324873" y="21876"/>
-                  <a:pt x="3136771" y="12587"/>
-                  <a:pt x="2814523" y="18288"/>
-                </a:cubicBezTo>
-                <a:cubicBezTo>
-                  <a:pt x="2492275" y="23989"/>
-                  <a:pt x="2294402" y="47111"/>
-                  <a:pt x="2154326" y="18288"/>
-                </a:cubicBezTo>
-                <a:cubicBezTo>
-                  <a:pt x="2014250" y="-10535"/>
-                  <a:pt x="1820317" y="33903"/>
-                  <a:pt x="1494130" y="18288"/>
-                </a:cubicBezTo>
-                <a:cubicBezTo>
-                  <a:pt x="1167943" y="2673"/>
-                  <a:pt x="948432" y="14868"/>
-                  <a:pt x="729691" y="18288"/>
-                </a:cubicBezTo>
-                <a:cubicBezTo>
-                  <a:pt x="510950" y="21708"/>
-                  <a:pt x="264032" y="24354"/>
-                  <a:pt x="0" y="18288"/>
-                </a:cubicBezTo>
-                <a:cubicBezTo>
-                  <a:pt x="189" y="14288"/>
-                  <a:pt x="-703" y="3747"/>
-                  <a:pt x="0" y="0"/>
-                </a:cubicBezTo>
-                <a:close/>
-              </a:path>
-            </a:pathLst>
-          </a:custGeom>
-          <a:solidFill>
-            <a:schemeClr val="accent2"/>
-          </a:solidFill>
-          <a:ln w="44450" cap="rnd">
-            <a:solidFill>
-              <a:schemeClr val="accent2"/>
-            </a:solidFill>
-            <a:round/>
-            <a:extLst>
-              <a:ext uri="{C807C97D-BFC1-408E-A445-0C87EB9F89A2}">
-                <ask:lineSketchStyleProps xmlns:ask="http://schemas.microsoft.com/office/drawing/2018/sketchyshapes" sd="2863741219">
-                  <a:prstGeom prst="rect">
-                    <a:avLst/>
-                  </a:prstGeom>
-                  <ask:type>
-                    <ask:lineSketchFreehand/>
-                  </ask:type>
-                </ask:lineSketchStyleProps>
-              </a:ext>
-            </a:extLst>
-          </a:ln>
-        </p:spPr>
-        <p:style>
-          <a:lnRef idx="2">
-            <a:schemeClr val="accent1">
-              <a:shade val="50000"/>
-            </a:schemeClr>
-          </a:lnRef>
-          <a:fillRef idx="1">
-            <a:schemeClr val="accent1"/>
-          </a:fillRef>
-          <a:effectRef idx="0">
-            <a:schemeClr val="accent1"/>
-          </a:effectRef>
-          <a:fontRef idx="minor">
-            <a:schemeClr val="lt1"/>
-          </a:fontRef>
-        </p:style>
-        <p:txBody>
-          <a:bodyPr rtlCol="0" anchor="ctr"/>
-          <a:lstStyle/>
-          <a:p>
-            <a:pPr algn="ctr"/>
-            <a:endParaRPr lang="en-US"/>
-          </a:p>
-        </p:txBody>
-      </p:sp>
-      <p:sp>
-        <p:nvSpPr>
-          <p:cNvPr id="3" name="Content Placeholder 2">
-            <a:extLst>
-              <a:ext uri="{FF2B5EF4-FFF2-40B4-BE49-F238E27FC236}">
-                <a16:creationId xmlns:a16="http://schemas.microsoft.com/office/drawing/2014/main" id="{254252FE-46D2-E549-120E-47118A28DB9A}"/>
-              </a:ext>
-            </a:extLst>
-          </p:cNvPr>
-          <p:cNvSpPr>
-            <a:spLocks noGrp="1"/>
-          </p:cNvSpPr>
-          <p:nvPr>
-            <p:ph idx="1"/>
-          </p:nvPr>
-        </p:nvSpPr>
-        <p:spPr>
-          <a:xfrm>
-            <a:off x="640080" y="2872899"/>
-            <a:ext cx="4243589" cy="3320668"/>
-          </a:xfrm>
-        </p:spPr>
-        <p:txBody>
-          <a:bodyPr>
-            <a:normAutofit/>
-          </a:bodyPr>
-          <a:lstStyle/>
-          <a:p>
-            <a:pPr>
-              <a:buFont typeface="Wingdings" pitchFamily="2" charset="2"/>
-              <a:buChar char="q"/>
-            </a:pPr>
-            <a:r>
-              <a:rPr lang="en-US" sz="2200" dirty="0">
-                <a:cs typeface="Arial" panose="020B0604020202020204" pitchFamily="34" charset="0"/>
-              </a:rPr>
-              <a:t>Build a ticket price prediction model and give facilities investment suggestions.</a:t>
-            </a:r>
-          </a:p>
-        </p:txBody>
-      </p:sp>
-      <p:pic>
-        <p:nvPicPr>
-          <p:cNvPr id="6" name="Picture 5" descr="A person skiing down a mountain&#10;&#10;Description automatically generated">
-            <a:extLst>
-              <a:ext uri="{FF2B5EF4-FFF2-40B4-BE49-F238E27FC236}">
-                <a16:creationId xmlns:a16="http://schemas.microsoft.com/office/drawing/2014/main" id="{E9E8423E-A1EB-2982-22EB-28484954D1D7}"/>
-              </a:ext>
-            </a:extLst>
-          </p:cNvPr>
-          <p:cNvPicPr>
-            <a:picLocks noChangeAspect="1"/>
-          </p:cNvPicPr>
-          <p:nvPr/>
-        </p:nvPicPr>
-        <p:blipFill rotWithShape="1">
-          <a:blip r:embed="rId2"/>
-          <a:srcRect l="26067" r="2216"/>
-          <a:stretch/>
-        </p:blipFill>
-        <p:spPr>
-          <a:xfrm>
-            <a:off x="5311702" y="10"/>
-            <a:ext cx="6878775" cy="6857990"/>
-          </a:xfrm>
-          <a:custGeom>
-            <a:avLst/>
-            <a:gdLst/>
-            <a:ahLst/>
-            <a:cxnLst/>
-            <a:rect l="l" t="t" r="r" b="b"/>
-            <a:pathLst>
-              <a:path w="6878775" h="6858000">
-                <a:moveTo>
-                  <a:pt x="1102973" y="0"/>
-                </a:moveTo>
-                <a:lnTo>
-                  <a:pt x="1160688" y="0"/>
-                </a:lnTo>
-                <a:lnTo>
-                  <a:pt x="983189" y="331786"/>
-                </a:lnTo>
-                <a:cubicBezTo>
-                  <a:pt x="914866" y="469145"/>
-                  <a:pt x="850355" y="608712"/>
-                  <a:pt x="789261" y="750263"/>
-                </a:cubicBezTo>
-                <a:cubicBezTo>
-                  <a:pt x="774307" y="784928"/>
-                  <a:pt x="759992" y="819849"/>
-                  <a:pt x="745295" y="854514"/>
-                </a:cubicBezTo>
-                <a:cubicBezTo>
-                  <a:pt x="756682" y="845393"/>
-                  <a:pt x="765489" y="833492"/>
-                  <a:pt x="770857" y="819975"/>
-                </a:cubicBezTo>
-                <a:cubicBezTo>
-                  <a:pt x="879943" y="589569"/>
-                  <a:pt x="999605" y="365513"/>
-                  <a:pt x="1131329" y="148742"/>
-                </a:cubicBezTo>
-                <a:lnTo>
-                  <a:pt x="1227589" y="0"/>
-                </a:lnTo>
-                <a:lnTo>
-                  <a:pt x="6878775" y="0"/>
-                </a:lnTo>
-                <a:lnTo>
-                  <a:pt x="6878775" y="6858000"/>
-                </a:lnTo>
-                <a:lnTo>
-                  <a:pt x="713521" y="6858000"/>
-                </a:lnTo>
-                <a:lnTo>
-                  <a:pt x="625642" y="6670527"/>
-                </a:lnTo>
-                <a:cubicBezTo>
-                  <a:pt x="507232" y="6398531"/>
-                  <a:pt x="403083" y="6118381"/>
-                  <a:pt x="312785" y="5830359"/>
-                </a:cubicBezTo>
-                <a:cubicBezTo>
-                  <a:pt x="278149" y="5719759"/>
-                  <a:pt x="248879" y="5607635"/>
-                  <a:pt x="212198" y="5480401"/>
-                </a:cubicBezTo>
-                <a:cubicBezTo>
-                  <a:pt x="212208" y="5491601"/>
-                  <a:pt x="212803" y="5502788"/>
-                  <a:pt x="213988" y="5513923"/>
-                </a:cubicBezTo>
-                <a:cubicBezTo>
-                  <a:pt x="264089" y="5723695"/>
-                  <a:pt x="307290" y="5935370"/>
-                  <a:pt x="365826" y="6142729"/>
-                </a:cubicBezTo>
-                <a:cubicBezTo>
-                  <a:pt x="433152" y="6380817"/>
-                  <a:pt x="510068" y="6614016"/>
-                  <a:pt x="597975" y="6841549"/>
-                </a:cubicBezTo>
-                <a:lnTo>
-                  <a:pt x="604824" y="6858000"/>
-                </a:lnTo>
-                <a:lnTo>
-                  <a:pt x="552056" y="6858000"/>
-                </a:lnTo>
-                <a:lnTo>
-                  <a:pt x="539576" y="6828295"/>
-                </a:lnTo>
-                <a:cubicBezTo>
-                  <a:pt x="380597" y="6414594"/>
-                  <a:pt x="260223" y="5988893"/>
-                  <a:pt x="171555" y="5552906"/>
-                </a:cubicBezTo>
-                <a:cubicBezTo>
-                  <a:pt x="91163" y="5157998"/>
-                  <a:pt x="43746" y="4758899"/>
-                  <a:pt x="12305" y="4357388"/>
-                </a:cubicBezTo>
-                <a:cubicBezTo>
-                  <a:pt x="-14281" y="4013908"/>
-                  <a:pt x="4507" y="3672965"/>
-                  <a:pt x="46684" y="3331516"/>
-                </a:cubicBezTo>
-                <a:cubicBezTo>
-                  <a:pt x="127203" y="2664286"/>
-                  <a:pt x="277819" y="2007265"/>
-                  <a:pt x="496065" y="1371196"/>
-                </a:cubicBezTo>
-                <a:cubicBezTo>
-                  <a:pt x="636273" y="966066"/>
-                  <a:pt x="800445" y="573253"/>
-                  <a:pt x="995723" y="196614"/>
-                </a:cubicBezTo>
-                <a:close/>
-              </a:path>
-            </a:pathLst>
-          </a:custGeom>
-        </p:spPr>
-      </p:pic>
-    </p:spTree>
-    <p:extLst>
-      <p:ext uri="{BB962C8B-B14F-4D97-AF65-F5344CB8AC3E}">
-        <p14:creationId xmlns:p14="http://schemas.microsoft.com/office/powerpoint/2010/main" val="2855593579"/>
-      </p:ext>
-    </p:extLst>
-  </p:cSld>
-  <p:clrMapOvr>
-    <a:masterClrMapping/>
-  </p:clrMapOvr>
-  <p:timing>
-    <p:tnLst>
-      <p:par>
-        <p:cTn id="1" dur="indefinite" restart="never" nodeType="tmRoot">
-          <p:childTnLst>
-            <p:seq concurrent="1" nextAc="seek">
-              <p:cTn id="2" dur="indefinite" nodeType="mainSeq">
-                <p:childTnLst>
-                  <p:par>
-                    <p:cTn id="3" fill="hold">
-                      <p:stCondLst>
-                        <p:cond delay="indefinite"/>
-                      </p:stCondLst>
-                      <p:childTnLst>
-                        <p:par>
-                          <p:cTn id="4" fill="hold">
-                            <p:stCondLst>
-                              <p:cond delay="0"/>
-                            </p:stCondLst>
-                            <p:childTnLst>
-                              <p:par>
-                                <p:cTn id="5" presetID="10" presetClass="entr" presetSubtype="0" fill="hold" grpId="0" nodeType="clickEffect">
-                                  <p:stCondLst>
-                                    <p:cond delay="0"/>
-                                  </p:stCondLst>
-                                  <p:childTnLst>
-                                    <p:set>
-                                      <p:cBhvr>
-                                        <p:cTn id="6" dur="1" fill="hold">
-                                          <p:stCondLst>
-                                            <p:cond delay="0"/>
-                                          </p:stCondLst>
-                                        </p:cTn>
-                                        <p:tgtEl>
-                                          <p:spTgt spid="2"/>
-                                        </p:tgtEl>
-                                        <p:attrNameLst>
-                                          <p:attrName>style.visibility</p:attrName>
-                                        </p:attrNameLst>
-                                      </p:cBhvr>
-                                      <p:to>
-                                        <p:strVal val="visible"/>
-                                      </p:to>
-                                    </p:set>
-                                    <p:animEffect transition="in" filter="fade">
-                                      <p:cBhvr>
-                                        <p:cTn id="7" dur="500"/>
-                                        <p:tgtEl>
-                                          <p:spTgt spid="2"/>
-                                        </p:tgtEl>
-                                      </p:cBhvr>
-                                    </p:animEffect>
-                                  </p:childTnLst>
-                                </p:cTn>
-                              </p:par>
-                            </p:childTnLst>
-                          </p:cTn>
-                        </p:par>
-                      </p:childTnLst>
-                    </p:cTn>
-                  </p:par>
-                  <p:par>
-                    <p:cTn id="8" fill="hold">
-                      <p:stCondLst>
-                        <p:cond delay="indefinite"/>
-                      </p:stCondLst>
-                      <p:childTnLst>
-                        <p:par>
-                          <p:cTn id="9" fill="hold">
-                            <p:stCondLst>
-                              <p:cond delay="0"/>
-                            </p:stCondLst>
-                            <p:childTnLst>
-                              <p:par>
-                                <p:cTn id="10" presetID="10" presetClass="entr" presetSubtype="0" fill="hold" grpId="0" nodeType="clickEffect">
-                                  <p:stCondLst>
-                                    <p:cond delay="0"/>
-                                  </p:stCondLst>
-                                  <p:childTnLst>
-                                    <p:set>
-                                      <p:cBhvr>
-                                        <p:cTn id="11" dur="1" fill="hold">
-                                          <p:stCondLst>
-                                            <p:cond delay="0"/>
-                                          </p:stCondLst>
-                                        </p:cTn>
-                                        <p:tgtEl>
-                                          <p:spTgt spid="3">
-                                            <p:txEl>
-                                              <p:pRg st="0" end="0"/>
-                                            </p:txEl>
-                                          </p:spTgt>
-                                        </p:tgtEl>
-                                        <p:attrNameLst>
-                                          <p:attrName>style.visibility</p:attrName>
-                                        </p:attrNameLst>
-                                      </p:cBhvr>
-                                      <p:to>
-                                        <p:strVal val="visible"/>
-                                      </p:to>
-                                    </p:set>
-                                    <p:animEffect transition="in" filter="fade">
-                                      <p:cBhvr>
-                                        <p:cTn id="12" dur="500"/>
-                                        <p:tgtEl>
-                                          <p:spTgt spid="3">
-                                            <p:txEl>
-                                              <p:pRg st="0" end="0"/>
-                                            </p:txEl>
-                                          </p:spTgt>
-                                        </p:tgtEl>
-                                      </p:cBhvr>
-                                    </p:animEffect>
-                                  </p:childTnLst>
-                                </p:cTn>
-                              </p:par>
-                            </p:childTnLst>
-                          </p:cTn>
-                        </p:par>
-                      </p:childTnLst>
-                    </p:cTn>
-                  </p:par>
-                </p:childTnLst>
-              </p:cTn>
-              <p:prevCondLst>
-                <p:cond evt="onPrev" delay="0">
-                  <p:tgtEl>
-                    <p:sldTgt/>
-                  </p:tgtEl>
-                </p:cond>
-              </p:prevCondLst>
-              <p:nextCondLst>
-                <p:cond evt="onNext" delay="0">
-                  <p:tgtEl>
-                    <p:sldTgt/>
-                  </p:tgtEl>
-                </p:cond>
-              </p:nextCondLst>
-            </p:seq>
-          </p:childTnLst>
-        </p:cTn>
-      </p:par>
-    </p:tnLst>
-    <p:bldLst>
-      <p:bldP spid="2" grpId="0"/>
-      <p:bldP spid="3" grpId="0" build="p"/>
-    </p:bldLst>
-  </p:timing>
-</p:sld>
-</file>
-
-<file path=ppt/slides/slide5.xml><?xml version="1.0" encoding="utf-8"?>
+<file path=ppt/slides/slide3.xml><?xml version="1.0" encoding="utf-8"?>
 <p:sld xmlns:a="http://schemas.openxmlformats.org/drawingml/2006/main" xmlns:r="http://schemas.openxmlformats.org/officeDocument/2006/relationships" xmlns:p="http://schemas.openxmlformats.org/presentationml/2006/main">
   <p:cSld>
     <p:bg>
@@ -7385,7 +5395,7 @@
 </p:sld>
 </file>
 
-<file path=ppt/slides/slide6.xml><?xml version="1.0" encoding="utf-8"?>
+<file path=ppt/slides/slide4.xml><?xml version="1.0" encoding="utf-8"?>
 <p:sld xmlns:a="http://schemas.openxmlformats.org/drawingml/2006/main" xmlns:r="http://schemas.openxmlformats.org/officeDocument/2006/relationships" xmlns:p="http://schemas.openxmlformats.org/presentationml/2006/main">
   <p:cSld>
     <p:bg>
@@ -8275,7 +6285,7 @@
 </p:sld>
 </file>
 
-<file path=ppt/slides/slide7.xml><?xml version="1.0" encoding="utf-8"?>
+<file path=ppt/slides/slide5.xml><?xml version="1.0" encoding="utf-8"?>
 <p:sld xmlns:a="http://schemas.openxmlformats.org/drawingml/2006/main" xmlns:r="http://schemas.openxmlformats.org/officeDocument/2006/relationships" xmlns:p="http://schemas.openxmlformats.org/presentationml/2006/main">
   <p:cSld>
     <p:bg>
@@ -8457,6 +6467,648 @@
     <p:extLst>
       <p:ext uri="{BB962C8B-B14F-4D97-AF65-F5344CB8AC3E}">
         <p14:creationId xmlns:p14="http://schemas.microsoft.com/office/powerpoint/2010/main" val="2009463096"/>
+      </p:ext>
+    </p:extLst>
+  </p:cSld>
+  <p:clrMapOvr>
+    <a:masterClrMapping/>
+  </p:clrMapOvr>
+  <p:timing>
+    <p:tnLst>
+      <p:par>
+        <p:cTn id="1" dur="indefinite" restart="never" nodeType="tmRoot">
+          <p:childTnLst>
+            <p:seq concurrent="1" nextAc="seek">
+              <p:cTn id="2" dur="indefinite" nodeType="mainSeq">
+                <p:childTnLst>
+                  <p:par>
+                    <p:cTn id="3" fill="hold">
+                      <p:stCondLst>
+                        <p:cond delay="indefinite"/>
+                      </p:stCondLst>
+                      <p:childTnLst>
+                        <p:par>
+                          <p:cTn id="4" fill="hold">
+                            <p:stCondLst>
+                              <p:cond delay="0"/>
+                            </p:stCondLst>
+                            <p:childTnLst>
+                              <p:par>
+                                <p:cTn id="5" presetID="10" presetClass="entr" presetSubtype="0" fill="hold" grpId="0" nodeType="clickEffect">
+                                  <p:stCondLst>
+                                    <p:cond delay="0"/>
+                                  </p:stCondLst>
+                                  <p:childTnLst>
+                                    <p:set>
+                                      <p:cBhvr>
+                                        <p:cTn id="6" dur="1" fill="hold">
+                                          <p:stCondLst>
+                                            <p:cond delay="0"/>
+                                          </p:stCondLst>
+                                        </p:cTn>
+                                        <p:tgtEl>
+                                          <p:spTgt spid="18"/>
+                                        </p:tgtEl>
+                                        <p:attrNameLst>
+                                          <p:attrName>style.visibility</p:attrName>
+                                        </p:attrNameLst>
+                                      </p:cBhvr>
+                                      <p:to>
+                                        <p:strVal val="visible"/>
+                                      </p:to>
+                                    </p:set>
+                                    <p:animEffect transition="in" filter="fade">
+                                      <p:cBhvr>
+                                        <p:cTn id="7" dur="500"/>
+                                        <p:tgtEl>
+                                          <p:spTgt spid="18"/>
+                                        </p:tgtEl>
+                                      </p:cBhvr>
+                                    </p:animEffect>
+                                  </p:childTnLst>
+                                </p:cTn>
+                              </p:par>
+                            </p:childTnLst>
+                          </p:cTn>
+                        </p:par>
+                      </p:childTnLst>
+                    </p:cTn>
+                  </p:par>
+                  <p:par>
+                    <p:cTn id="8" fill="hold">
+                      <p:stCondLst>
+                        <p:cond delay="indefinite"/>
+                      </p:stCondLst>
+                      <p:childTnLst>
+                        <p:par>
+                          <p:cTn id="9" fill="hold">
+                            <p:stCondLst>
+                              <p:cond delay="0"/>
+                            </p:stCondLst>
+                            <p:childTnLst>
+                              <p:par>
+                                <p:cTn id="10" presetID="10" presetClass="entr" presetSubtype="0" fill="hold" grpId="0" nodeType="clickEffect">
+                                  <p:stCondLst>
+                                    <p:cond delay="0"/>
+                                  </p:stCondLst>
+                                  <p:childTnLst>
+                                    <p:set>
+                                      <p:cBhvr>
+                                        <p:cTn id="11" dur="1" fill="hold">
+                                          <p:stCondLst>
+                                            <p:cond delay="0"/>
+                                          </p:stCondLst>
+                                        </p:cTn>
+                                        <p:tgtEl>
+                                          <p:spTgt spid="19"/>
+                                        </p:tgtEl>
+                                        <p:attrNameLst>
+                                          <p:attrName>style.visibility</p:attrName>
+                                        </p:attrNameLst>
+                                      </p:cBhvr>
+                                      <p:to>
+                                        <p:strVal val="visible"/>
+                                      </p:to>
+                                    </p:set>
+                                    <p:animEffect transition="in" filter="fade">
+                                      <p:cBhvr>
+                                        <p:cTn id="12" dur="500"/>
+                                        <p:tgtEl>
+                                          <p:spTgt spid="19"/>
+                                        </p:tgtEl>
+                                      </p:cBhvr>
+                                    </p:animEffect>
+                                  </p:childTnLst>
+                                </p:cTn>
+                              </p:par>
+                            </p:childTnLst>
+                          </p:cTn>
+                        </p:par>
+                      </p:childTnLst>
+                    </p:cTn>
+                  </p:par>
+                </p:childTnLst>
+              </p:cTn>
+              <p:prevCondLst>
+                <p:cond evt="onPrev" delay="0">
+                  <p:tgtEl>
+                    <p:sldTgt/>
+                  </p:tgtEl>
+                </p:cond>
+              </p:prevCondLst>
+              <p:nextCondLst>
+                <p:cond evt="onNext" delay="0">
+                  <p:tgtEl>
+                    <p:sldTgt/>
+                  </p:tgtEl>
+                </p:cond>
+              </p:nextCondLst>
+            </p:seq>
+          </p:childTnLst>
+        </p:cTn>
+      </p:par>
+    </p:tnLst>
+    <p:bldLst>
+      <p:bldP spid="18" grpId="0"/>
+      <p:bldP spid="19" grpId="0"/>
+    </p:bldLst>
+  </p:timing>
+</p:sld>
+</file>
+
+<file path=ppt/slides/slide6.xml><?xml version="1.0" encoding="utf-8"?>
+<p:sld xmlns:a="http://schemas.openxmlformats.org/drawingml/2006/main" xmlns:r="http://schemas.openxmlformats.org/officeDocument/2006/relationships" xmlns:p="http://schemas.openxmlformats.org/presentationml/2006/main">
+  <p:cSld>
+    <p:spTree>
+      <p:nvGrpSpPr>
+        <p:cNvPr id="1" name=""/>
+        <p:cNvGrpSpPr/>
+        <p:nvPr/>
+      </p:nvGrpSpPr>
+      <p:grpSpPr>
+        <a:xfrm>
+          <a:off x="0" y="0"/>
+          <a:ext cx="0" cy="0"/>
+          <a:chOff x="0" y="0"/>
+          <a:chExt cx="0" cy="0"/>
+        </a:xfrm>
+      </p:grpSpPr>
+      <p:pic>
+        <p:nvPicPr>
+          <p:cNvPr id="15" name="Picture 14">
+            <a:extLst>
+              <a:ext uri="{FF2B5EF4-FFF2-40B4-BE49-F238E27FC236}">
+                <a16:creationId xmlns:a16="http://schemas.microsoft.com/office/drawing/2014/main" id="{D7CEA2D1-EA7A-EE38-42A1-E047C1A0A9A0}"/>
+              </a:ext>
+            </a:extLst>
+          </p:cNvPr>
+          <p:cNvPicPr>
+            <a:picLocks noChangeAspect="1"/>
+          </p:cNvPicPr>
+          <p:nvPr/>
+        </p:nvPicPr>
+        <p:blipFill>
+          <a:blip r:embed="rId2"/>
+          <a:srcRect/>
+          <a:stretch/>
+        </p:blipFill>
+        <p:spPr>
+          <a:xfrm>
+            <a:off x="6437437" y="226196"/>
+            <a:ext cx="5758796" cy="3195079"/>
+          </a:xfrm>
+          <a:prstGeom prst="rect">
+            <a:avLst/>
+          </a:prstGeom>
+        </p:spPr>
+      </p:pic>
+      <p:pic>
+        <p:nvPicPr>
+          <p:cNvPr id="17" name="Picture 16">
+            <a:extLst>
+              <a:ext uri="{FF2B5EF4-FFF2-40B4-BE49-F238E27FC236}">
+                <a16:creationId xmlns:a16="http://schemas.microsoft.com/office/drawing/2014/main" id="{22F6911D-9F7A-FC6F-9D83-444A81D709D8}"/>
+              </a:ext>
+            </a:extLst>
+          </p:cNvPr>
+          <p:cNvPicPr>
+            <a:picLocks noChangeAspect="1"/>
+          </p:cNvPicPr>
+          <p:nvPr/>
+        </p:nvPicPr>
+        <p:blipFill>
+          <a:blip r:embed="rId3"/>
+          <a:srcRect/>
+          <a:stretch/>
+        </p:blipFill>
+        <p:spPr>
+          <a:xfrm>
+            <a:off x="6437437" y="3664743"/>
+            <a:ext cx="5754564" cy="3192731"/>
+          </a:xfrm>
+          <a:prstGeom prst="rect">
+            <a:avLst/>
+          </a:prstGeom>
+        </p:spPr>
+      </p:pic>
+      <p:sp>
+        <p:nvSpPr>
+          <p:cNvPr id="18" name="Title 1">
+            <a:extLst>
+              <a:ext uri="{FF2B5EF4-FFF2-40B4-BE49-F238E27FC236}">
+                <a16:creationId xmlns:a16="http://schemas.microsoft.com/office/drawing/2014/main" id="{AC7E46E1-A036-8216-7765-2CBE689D1ACC}"/>
+              </a:ext>
+            </a:extLst>
+          </p:cNvPr>
+          <p:cNvSpPr>
+            <a:spLocks noGrp="1"/>
+          </p:cNvSpPr>
+          <p:nvPr>
+            <p:ph type="title"/>
+          </p:nvPr>
+        </p:nvSpPr>
+        <p:spPr>
+          <a:xfrm>
+            <a:off x="488519" y="959948"/>
+            <a:ext cx="5266045" cy="1727574"/>
+          </a:xfrm>
+        </p:spPr>
+        <p:txBody>
+          <a:bodyPr anchor="b">
+            <a:noAutofit/>
+          </a:bodyPr>
+          <a:lstStyle/>
+          <a:p>
+            <a:r>
+              <a:rPr lang="en-US" sz="3000" dirty="0">
+                <a:latin typeface="+mn-lt"/>
+              </a:rPr>
+              <a:t>Big Mountain is very high up the league table of snow making area.</a:t>
+            </a:r>
+          </a:p>
+        </p:txBody>
+      </p:sp>
+      <p:sp>
+        <p:nvSpPr>
+          <p:cNvPr id="19" name="Title 1">
+            <a:extLst>
+              <a:ext uri="{FF2B5EF4-FFF2-40B4-BE49-F238E27FC236}">
+                <a16:creationId xmlns:a16="http://schemas.microsoft.com/office/drawing/2014/main" id="{CC99FE75-516F-3DCE-6080-7FE02D010618}"/>
+              </a:ext>
+            </a:extLst>
+          </p:cNvPr>
+          <p:cNvSpPr txBox="1">
+            <a:spLocks/>
+          </p:cNvSpPr>
+          <p:nvPr/>
+        </p:nvSpPr>
+        <p:spPr>
+          <a:xfrm>
+            <a:off x="488519" y="4634562"/>
+            <a:ext cx="5266045" cy="1253092"/>
+          </a:xfrm>
+          <a:prstGeom prst="rect">
+            <a:avLst/>
+          </a:prstGeom>
+        </p:spPr>
+        <p:txBody>
+          <a:bodyPr vert="horz" lIns="91440" tIns="45720" rIns="91440" bIns="45720" rtlCol="0" anchor="b">
+            <a:normAutofit fontScale="97500"/>
+          </a:bodyPr>
+          <a:lstStyle>
+            <a:lvl1pPr algn="l" defTabSz="914400" rtl="0" eaLnBrk="1" latinLnBrk="0" hangingPunct="1">
+              <a:lnSpc>
+                <a:spcPct val="90000"/>
+              </a:lnSpc>
+              <a:spcBef>
+                <a:spcPct val="0"/>
+              </a:spcBef>
+              <a:buNone/>
+              <a:defRPr sz="4400" kern="1200">
+                <a:solidFill>
+                  <a:schemeClr val="tx1"/>
+                </a:solidFill>
+                <a:latin typeface="+mj-lt"/>
+                <a:ea typeface="+mj-ea"/>
+                <a:cs typeface="+mj-cs"/>
+              </a:defRPr>
+            </a:lvl1pPr>
+          </a:lstStyle>
+          <a:p>
+            <a:r>
+              <a:rPr lang="en-US" sz="3100" dirty="0">
+                <a:latin typeface="+mn-lt"/>
+              </a:rPr>
+              <a:t>Big Mountain has amongst the highest number of total chairs.</a:t>
+            </a:r>
+          </a:p>
+        </p:txBody>
+      </p:sp>
+    </p:spTree>
+    <p:extLst>
+      <p:ext uri="{BB962C8B-B14F-4D97-AF65-F5344CB8AC3E}">
+        <p14:creationId xmlns:p14="http://schemas.microsoft.com/office/powerpoint/2010/main" val="1713891478"/>
+      </p:ext>
+    </p:extLst>
+  </p:cSld>
+  <p:clrMapOvr>
+    <a:masterClrMapping/>
+  </p:clrMapOvr>
+  <p:timing>
+    <p:tnLst>
+      <p:par>
+        <p:cTn id="1" dur="indefinite" restart="never" nodeType="tmRoot">
+          <p:childTnLst>
+            <p:seq concurrent="1" nextAc="seek">
+              <p:cTn id="2" dur="indefinite" nodeType="mainSeq">
+                <p:childTnLst>
+                  <p:par>
+                    <p:cTn id="3" fill="hold">
+                      <p:stCondLst>
+                        <p:cond delay="indefinite"/>
+                      </p:stCondLst>
+                      <p:childTnLst>
+                        <p:par>
+                          <p:cTn id="4" fill="hold">
+                            <p:stCondLst>
+                              <p:cond delay="0"/>
+                            </p:stCondLst>
+                            <p:childTnLst>
+                              <p:par>
+                                <p:cTn id="5" presetID="10" presetClass="entr" presetSubtype="0" fill="hold" grpId="0" nodeType="clickEffect">
+                                  <p:stCondLst>
+                                    <p:cond delay="0"/>
+                                  </p:stCondLst>
+                                  <p:childTnLst>
+                                    <p:set>
+                                      <p:cBhvr>
+                                        <p:cTn id="6" dur="1" fill="hold">
+                                          <p:stCondLst>
+                                            <p:cond delay="0"/>
+                                          </p:stCondLst>
+                                        </p:cTn>
+                                        <p:tgtEl>
+                                          <p:spTgt spid="18"/>
+                                        </p:tgtEl>
+                                        <p:attrNameLst>
+                                          <p:attrName>style.visibility</p:attrName>
+                                        </p:attrNameLst>
+                                      </p:cBhvr>
+                                      <p:to>
+                                        <p:strVal val="visible"/>
+                                      </p:to>
+                                    </p:set>
+                                    <p:animEffect transition="in" filter="fade">
+                                      <p:cBhvr>
+                                        <p:cTn id="7" dur="500"/>
+                                        <p:tgtEl>
+                                          <p:spTgt spid="18"/>
+                                        </p:tgtEl>
+                                      </p:cBhvr>
+                                    </p:animEffect>
+                                  </p:childTnLst>
+                                </p:cTn>
+                              </p:par>
+                            </p:childTnLst>
+                          </p:cTn>
+                        </p:par>
+                      </p:childTnLst>
+                    </p:cTn>
+                  </p:par>
+                  <p:par>
+                    <p:cTn id="8" fill="hold">
+                      <p:stCondLst>
+                        <p:cond delay="indefinite"/>
+                      </p:stCondLst>
+                      <p:childTnLst>
+                        <p:par>
+                          <p:cTn id="9" fill="hold">
+                            <p:stCondLst>
+                              <p:cond delay="0"/>
+                            </p:stCondLst>
+                            <p:childTnLst>
+                              <p:par>
+                                <p:cTn id="10" presetID="10" presetClass="entr" presetSubtype="0" fill="hold" grpId="0" nodeType="clickEffect">
+                                  <p:stCondLst>
+                                    <p:cond delay="0"/>
+                                  </p:stCondLst>
+                                  <p:childTnLst>
+                                    <p:set>
+                                      <p:cBhvr>
+                                        <p:cTn id="11" dur="1" fill="hold">
+                                          <p:stCondLst>
+                                            <p:cond delay="0"/>
+                                          </p:stCondLst>
+                                        </p:cTn>
+                                        <p:tgtEl>
+                                          <p:spTgt spid="19"/>
+                                        </p:tgtEl>
+                                        <p:attrNameLst>
+                                          <p:attrName>style.visibility</p:attrName>
+                                        </p:attrNameLst>
+                                      </p:cBhvr>
+                                      <p:to>
+                                        <p:strVal val="visible"/>
+                                      </p:to>
+                                    </p:set>
+                                    <p:animEffect transition="in" filter="fade">
+                                      <p:cBhvr>
+                                        <p:cTn id="12" dur="500"/>
+                                        <p:tgtEl>
+                                          <p:spTgt spid="19"/>
+                                        </p:tgtEl>
+                                      </p:cBhvr>
+                                    </p:animEffect>
+                                  </p:childTnLst>
+                                </p:cTn>
+                              </p:par>
+                            </p:childTnLst>
+                          </p:cTn>
+                        </p:par>
+                      </p:childTnLst>
+                    </p:cTn>
+                  </p:par>
+                </p:childTnLst>
+              </p:cTn>
+              <p:prevCondLst>
+                <p:cond evt="onPrev" delay="0">
+                  <p:tgtEl>
+                    <p:sldTgt/>
+                  </p:tgtEl>
+                </p:cond>
+              </p:prevCondLst>
+              <p:nextCondLst>
+                <p:cond evt="onNext" delay="0">
+                  <p:tgtEl>
+                    <p:sldTgt/>
+                  </p:tgtEl>
+                </p:cond>
+              </p:nextCondLst>
+            </p:seq>
+          </p:childTnLst>
+        </p:cTn>
+      </p:par>
+    </p:tnLst>
+    <p:bldLst>
+      <p:bldP spid="18" grpId="0"/>
+      <p:bldP spid="19" grpId="0"/>
+    </p:bldLst>
+  </p:timing>
+</p:sld>
+</file>
+
+<file path=ppt/slides/slide7.xml><?xml version="1.0" encoding="utf-8"?>
+<p:sld xmlns:a="http://schemas.openxmlformats.org/drawingml/2006/main" xmlns:r="http://schemas.openxmlformats.org/officeDocument/2006/relationships" xmlns:p="http://schemas.openxmlformats.org/presentationml/2006/main">
+  <p:cSld>
+    <p:spTree>
+      <p:nvGrpSpPr>
+        <p:cNvPr id="1" name=""/>
+        <p:cNvGrpSpPr/>
+        <p:nvPr/>
+      </p:nvGrpSpPr>
+      <p:grpSpPr>
+        <a:xfrm>
+          <a:off x="0" y="0"/>
+          <a:ext cx="0" cy="0"/>
+          <a:chOff x="0" y="0"/>
+          <a:chExt cx="0" cy="0"/>
+        </a:xfrm>
+      </p:grpSpPr>
+      <p:pic>
+        <p:nvPicPr>
+          <p:cNvPr id="15" name="Picture 14">
+            <a:extLst>
+              <a:ext uri="{FF2B5EF4-FFF2-40B4-BE49-F238E27FC236}">
+                <a16:creationId xmlns:a16="http://schemas.microsoft.com/office/drawing/2014/main" id="{D7CEA2D1-EA7A-EE38-42A1-E047C1A0A9A0}"/>
+              </a:ext>
+            </a:extLst>
+          </p:cNvPr>
+          <p:cNvPicPr>
+            <a:picLocks noChangeAspect="1"/>
+          </p:cNvPicPr>
+          <p:nvPr/>
+        </p:nvPicPr>
+        <p:blipFill>
+          <a:blip r:embed="rId2"/>
+          <a:srcRect/>
+          <a:stretch/>
+        </p:blipFill>
+        <p:spPr>
+          <a:xfrm>
+            <a:off x="6437437" y="241961"/>
+            <a:ext cx="5758796" cy="3163549"/>
+          </a:xfrm>
+          <a:prstGeom prst="rect">
+            <a:avLst/>
+          </a:prstGeom>
+        </p:spPr>
+      </p:pic>
+      <p:pic>
+        <p:nvPicPr>
+          <p:cNvPr id="17" name="Picture 16">
+            <a:extLst>
+              <a:ext uri="{FF2B5EF4-FFF2-40B4-BE49-F238E27FC236}">
+                <a16:creationId xmlns:a16="http://schemas.microsoft.com/office/drawing/2014/main" id="{22F6911D-9F7A-FC6F-9D83-444A81D709D8}"/>
+              </a:ext>
+            </a:extLst>
+          </p:cNvPr>
+          <p:cNvPicPr>
+            <a:picLocks noChangeAspect="1"/>
+          </p:cNvPicPr>
+          <p:nvPr/>
+        </p:nvPicPr>
+        <p:blipFill>
+          <a:blip r:embed="rId3"/>
+          <a:srcRect/>
+          <a:stretch/>
+        </p:blipFill>
+        <p:spPr>
+          <a:xfrm>
+            <a:off x="6437437" y="3675280"/>
+            <a:ext cx="5754564" cy="3171657"/>
+          </a:xfrm>
+          <a:prstGeom prst="rect">
+            <a:avLst/>
+          </a:prstGeom>
+        </p:spPr>
+      </p:pic>
+      <p:sp>
+        <p:nvSpPr>
+          <p:cNvPr id="18" name="Title 1">
+            <a:extLst>
+              <a:ext uri="{FF2B5EF4-FFF2-40B4-BE49-F238E27FC236}">
+                <a16:creationId xmlns:a16="http://schemas.microsoft.com/office/drawing/2014/main" id="{AC7E46E1-A036-8216-7765-2CBE689D1ACC}"/>
+              </a:ext>
+            </a:extLst>
+          </p:cNvPr>
+          <p:cNvSpPr>
+            <a:spLocks noGrp="1"/>
+          </p:cNvSpPr>
+          <p:nvPr>
+            <p:ph type="title"/>
+          </p:nvPr>
+        </p:nvSpPr>
+        <p:spPr>
+          <a:xfrm>
+            <a:off x="655068" y="959948"/>
+            <a:ext cx="5266045" cy="1727574"/>
+          </a:xfrm>
+        </p:spPr>
+        <p:txBody>
+          <a:bodyPr anchor="b">
+            <a:noAutofit/>
+          </a:bodyPr>
+          <a:lstStyle/>
+          <a:p>
+            <a:r>
+              <a:rPr lang="en-US" sz="3000" dirty="0">
+                <a:latin typeface="+mn-lt"/>
+              </a:rPr>
+              <a:t>Most resorts have no fast quads. Big Mountain has 3, which puts it high up that league table.</a:t>
+            </a:r>
+          </a:p>
+        </p:txBody>
+      </p:sp>
+      <p:sp>
+        <p:nvSpPr>
+          <p:cNvPr id="19" name="Title 1">
+            <a:extLst>
+              <a:ext uri="{FF2B5EF4-FFF2-40B4-BE49-F238E27FC236}">
+                <a16:creationId xmlns:a16="http://schemas.microsoft.com/office/drawing/2014/main" id="{CC99FE75-516F-3DCE-6080-7FE02D010618}"/>
+              </a:ext>
+            </a:extLst>
+          </p:cNvPr>
+          <p:cNvSpPr txBox="1">
+            <a:spLocks/>
+          </p:cNvSpPr>
+          <p:nvPr/>
+        </p:nvSpPr>
+        <p:spPr>
+          <a:xfrm>
+            <a:off x="655069" y="4339213"/>
+            <a:ext cx="5266045" cy="1843790"/>
+          </a:xfrm>
+          <a:prstGeom prst="rect">
+            <a:avLst/>
+          </a:prstGeom>
+        </p:spPr>
+        <p:txBody>
+          <a:bodyPr vert="horz" lIns="91440" tIns="45720" rIns="91440" bIns="45720" rtlCol="0" anchor="b">
+            <a:normAutofit fontScale="97500"/>
+          </a:bodyPr>
+          <a:lstStyle>
+            <a:lvl1pPr algn="l" defTabSz="914400" rtl="0" eaLnBrk="1" latinLnBrk="0" hangingPunct="1">
+              <a:lnSpc>
+                <a:spcPct val="90000"/>
+              </a:lnSpc>
+              <a:spcBef>
+                <a:spcPct val="0"/>
+              </a:spcBef>
+              <a:buNone/>
+              <a:defRPr sz="4400" kern="1200">
+                <a:solidFill>
+                  <a:schemeClr val="tx1"/>
+                </a:solidFill>
+                <a:latin typeface="+mj-lt"/>
+                <a:ea typeface="+mj-ea"/>
+                <a:cs typeface="+mj-cs"/>
+              </a:defRPr>
+            </a:lvl1pPr>
+          </a:lstStyle>
+          <a:p>
+            <a:r>
+              <a:rPr lang="en-US" sz="3100" dirty="0">
+                <a:latin typeface="+mn-lt"/>
+              </a:rPr>
+              <a:t>Big Mountain compares well for the number of runs. There are some resorts with more, but not many.</a:t>
+            </a:r>
+          </a:p>
+        </p:txBody>
+      </p:sp>
+    </p:spTree>
+    <p:extLst>
+      <p:ext uri="{BB962C8B-B14F-4D97-AF65-F5344CB8AC3E}">
+        <p14:creationId xmlns:p14="http://schemas.microsoft.com/office/powerpoint/2010/main" val="3497096138"/>
       </p:ext>
     </p:extLst>
   </p:cSld>
@@ -8644,8 +7296,8 @@
         </p:blipFill>
         <p:spPr>
           <a:xfrm>
-            <a:off x="6437437" y="226196"/>
-            <a:ext cx="5758796" cy="3195079"/>
+            <a:off x="6465852" y="241961"/>
+            <a:ext cx="5701965" cy="3163549"/>
           </a:xfrm>
           <a:prstGeom prst="rect">
             <a:avLst/>
@@ -8673,8 +7325,8 @@
         </p:blipFill>
         <p:spPr>
           <a:xfrm>
-            <a:off x="6437437" y="3664743"/>
-            <a:ext cx="5754564" cy="3192731"/>
+            <a:off x="6437437" y="3680496"/>
+            <a:ext cx="5754564" cy="3161224"/>
           </a:xfrm>
           <a:prstGeom prst="rect">
             <a:avLst/>
@@ -8699,8 +7351,8 @@
         </p:nvSpPr>
         <p:spPr>
           <a:xfrm>
-            <a:off x="488519" y="959948"/>
-            <a:ext cx="5266045" cy="1727574"/>
+            <a:off x="685050" y="734807"/>
+            <a:ext cx="5266045" cy="2177856"/>
           </a:xfrm>
         </p:spPr>
         <p:txBody>
@@ -8713,7 +7365,7 @@
               <a:rPr lang="en-US" sz="3000" dirty="0">
                 <a:latin typeface="+mn-lt"/>
               </a:rPr>
-              <a:t>Big Mountain is very high up the league table of snow making area.</a:t>
+              <a:t>Big Mountain has one of the longest runs. Although it is just over half the length of the longest, the longer ones are rare.</a:t>
             </a:r>
           </a:p>
         </p:txBody>
@@ -8734,8 +7386,8 @@
         </p:nvSpPr>
         <p:spPr>
           <a:xfrm>
-            <a:off x="488519" y="4634562"/>
-            <a:ext cx="5266045" cy="1253092"/>
+            <a:off x="685049" y="4172180"/>
+            <a:ext cx="5266045" cy="2177855"/>
           </a:xfrm>
           <a:prstGeom prst="rect">
             <a:avLst/>
@@ -8769,7 +7421,7 @@
               <a:rPr lang="en-US" sz="3100" dirty="0">
                 <a:latin typeface="+mn-lt"/>
               </a:rPr>
-              <a:t>Big Mountain has amongst the highest number of total chairs.</a:t>
+              <a:t>Big Mountain has one of the longest runs. Although it is just over half the length of the longest, the longer ones are rare.</a:t>
             </a:r>
           </a:p>
         </p:txBody>
@@ -8777,7 +7429,7 @@
     </p:spTree>
     <p:extLst>
       <p:ext uri="{BB962C8B-B14F-4D97-AF65-F5344CB8AC3E}">
-        <p14:creationId xmlns:p14="http://schemas.microsoft.com/office/powerpoint/2010/main" val="1713891478"/>
+        <p14:creationId xmlns:p14="http://schemas.microsoft.com/office/powerpoint/2010/main" val="3688093235"/>
       </p:ext>
     </p:extLst>
   </p:cSld>
@@ -8930,6 +7582,14 @@
 <file path=ppt/slides/slide9.xml><?xml version="1.0" encoding="utf-8"?>
 <p:sld xmlns:a="http://schemas.openxmlformats.org/drawingml/2006/main" xmlns:r="http://schemas.openxmlformats.org/officeDocument/2006/relationships" xmlns:p="http://schemas.openxmlformats.org/presentationml/2006/main">
   <p:cSld>
+    <p:bg>
+      <p:bgPr>
+        <a:solidFill>
+          <a:schemeClr val="bg1"/>
+        </a:solidFill>
+        <a:effectLst/>
+      </p:bgPr>
+    </p:bg>
     <p:spTree>
       <p:nvGrpSpPr>
         <p:cNvPr id="1" name=""/>
@@ -8944,12 +7604,441 @@
           <a:chExt cx="0" cy="0"/>
         </a:xfrm>
       </p:grpSpPr>
+      <p:sp useBgFill="1">
+        <p:nvSpPr>
+          <p:cNvPr id="9" name="Rectangle 8">
+            <a:extLst>
+              <a:ext uri="{FF2B5EF4-FFF2-40B4-BE49-F238E27FC236}">
+                <a16:creationId xmlns:a16="http://schemas.microsoft.com/office/drawing/2014/main" id="{F13C74B1-5B17-4795-BED0-7140497B445A}"/>
+              </a:ext>
+              <a:ext uri="{C183D7F6-B498-43B3-948B-1728B52AA6E4}">
+                <adec:decorative xmlns:adec="http://schemas.microsoft.com/office/drawing/2017/decorative" val="1"/>
+              </a:ext>
+            </a:extLst>
+          </p:cNvPr>
+          <p:cNvSpPr>
+            <a:spLocks noGrp="1" noRot="1" noChangeAspect="1" noMove="1" noResize="1" noEditPoints="1" noAdjustHandles="1" noChangeArrowheads="1" noChangeShapeType="1" noTextEdit="1"/>
+          </p:cNvSpPr>
+          <p:nvPr>
+            <p:extLst>
+              <p:ext uri="{386F3935-93C4-4BCD-93E2-E3B085C9AB24}">
+                <p16:designElem xmlns:p16="http://schemas.microsoft.com/office/powerpoint/2015/main" val="1"/>
+              </p:ext>
+            </p:extLst>
+          </p:nvPr>
+        </p:nvSpPr>
+        <p:spPr>
+          <a:xfrm>
+            <a:off x="0" y="0"/>
+            <a:ext cx="12188952" cy="6858000"/>
+          </a:xfrm>
+          <a:prstGeom prst="rect">
+            <a:avLst/>
+          </a:prstGeom>
+          <a:ln>
+            <a:noFill/>
+          </a:ln>
+        </p:spPr>
+        <p:style>
+          <a:lnRef idx="2">
+            <a:schemeClr val="accent1">
+              <a:shade val="50000"/>
+            </a:schemeClr>
+          </a:lnRef>
+          <a:fillRef idx="1">
+            <a:schemeClr val="accent1"/>
+          </a:fillRef>
+          <a:effectRef idx="0">
+            <a:schemeClr val="accent1"/>
+          </a:effectRef>
+          <a:fontRef idx="minor">
+            <a:schemeClr val="lt1"/>
+          </a:fontRef>
+        </p:style>
+        <p:txBody>
+          <a:bodyPr rtlCol="0" anchor="ctr"/>
+          <a:lstStyle/>
+          <a:p>
+            <a:pPr algn="ctr"/>
+            <a:endParaRPr lang="en-US"/>
+          </a:p>
+        </p:txBody>
+      </p:sp>
+      <p:sp>
+        <p:nvSpPr>
+          <p:cNvPr id="2" name="Title 1">
+            <a:extLst>
+              <a:ext uri="{FF2B5EF4-FFF2-40B4-BE49-F238E27FC236}">
+                <a16:creationId xmlns:a16="http://schemas.microsoft.com/office/drawing/2014/main" id="{4BC87D8F-3277-AAD6-2480-C887D1D302F9}"/>
+              </a:ext>
+            </a:extLst>
+          </p:cNvPr>
+          <p:cNvSpPr>
+            <a:spLocks noGrp="1"/>
+          </p:cNvSpPr>
+          <p:nvPr>
+            <p:ph type="title"/>
+          </p:nvPr>
+        </p:nvSpPr>
+        <p:spPr>
+          <a:xfrm>
+            <a:off x="640080" y="325369"/>
+            <a:ext cx="4368602" cy="1956841"/>
+          </a:xfrm>
+        </p:spPr>
+        <p:txBody>
+          <a:bodyPr anchor="b">
+            <a:normAutofit/>
+          </a:bodyPr>
+          <a:lstStyle/>
+          <a:p>
+            <a:r>
+              <a:rPr lang="en-US" sz="5400" dirty="0">
+                <a:latin typeface="+mn-lt"/>
+              </a:rPr>
+              <a:t>Conclusion </a:t>
+            </a:r>
+          </a:p>
+        </p:txBody>
+      </p:sp>
+      <p:sp>
+        <p:nvSpPr>
+          <p:cNvPr id="11" name="sketchy line">
+            <a:extLst>
+              <a:ext uri="{FF2B5EF4-FFF2-40B4-BE49-F238E27FC236}">
+                <a16:creationId xmlns:a16="http://schemas.microsoft.com/office/drawing/2014/main" id="{D4974D33-8DC5-464E-8C6D-BE58F0669C17}"/>
+              </a:ext>
+              <a:ext uri="{C183D7F6-B498-43B3-948B-1728B52AA6E4}">
+                <adec:decorative xmlns:adec="http://schemas.microsoft.com/office/drawing/2017/decorative" val="1"/>
+              </a:ext>
+            </a:extLst>
+          </p:cNvPr>
+          <p:cNvSpPr>
+            <a:spLocks noGrp="1" noRot="1" noChangeAspect="1" noMove="1" noResize="1" noEditPoints="1" noAdjustHandles="1" noChangeArrowheads="1" noChangeShapeType="1" noTextEdit="1"/>
+          </p:cNvSpPr>
+          <p:nvPr>
+            <p:extLst>
+              <p:ext uri="{386F3935-93C4-4BCD-93E2-E3B085C9AB24}">
+                <p16:designElem xmlns:p16="http://schemas.microsoft.com/office/powerpoint/2015/main" val="1"/>
+              </p:ext>
+            </p:extLst>
+          </p:nvPr>
+        </p:nvSpPr>
+        <p:spPr>
+          <a:xfrm>
+            <a:off x="640080" y="2586994"/>
+            <a:ext cx="3474720" cy="18288"/>
+          </a:xfrm>
+          <a:custGeom>
+            <a:avLst/>
+            <a:gdLst>
+              <a:gd name="connsiteX0" fmla="*/ 0 w 3474720"/>
+              <a:gd name="connsiteY0" fmla="*/ 0 h 18288"/>
+              <a:gd name="connsiteX1" fmla="*/ 694944 w 3474720"/>
+              <a:gd name="connsiteY1" fmla="*/ 0 h 18288"/>
+              <a:gd name="connsiteX2" fmla="*/ 1355141 w 3474720"/>
+              <a:gd name="connsiteY2" fmla="*/ 0 h 18288"/>
+              <a:gd name="connsiteX3" fmla="*/ 2015338 w 3474720"/>
+              <a:gd name="connsiteY3" fmla="*/ 0 h 18288"/>
+              <a:gd name="connsiteX4" fmla="*/ 2779776 w 3474720"/>
+              <a:gd name="connsiteY4" fmla="*/ 0 h 18288"/>
+              <a:gd name="connsiteX5" fmla="*/ 3474720 w 3474720"/>
+              <a:gd name="connsiteY5" fmla="*/ 0 h 18288"/>
+              <a:gd name="connsiteX6" fmla="*/ 3474720 w 3474720"/>
+              <a:gd name="connsiteY6" fmla="*/ 18288 h 18288"/>
+              <a:gd name="connsiteX7" fmla="*/ 2779776 w 3474720"/>
+              <a:gd name="connsiteY7" fmla="*/ 18288 h 18288"/>
+              <a:gd name="connsiteX8" fmla="*/ 2189074 w 3474720"/>
+              <a:gd name="connsiteY8" fmla="*/ 18288 h 18288"/>
+              <a:gd name="connsiteX9" fmla="*/ 1528877 w 3474720"/>
+              <a:gd name="connsiteY9" fmla="*/ 18288 h 18288"/>
+              <a:gd name="connsiteX10" fmla="*/ 868680 w 3474720"/>
+              <a:gd name="connsiteY10" fmla="*/ 18288 h 18288"/>
+              <a:gd name="connsiteX11" fmla="*/ 0 w 3474720"/>
+              <a:gd name="connsiteY11" fmla="*/ 18288 h 18288"/>
+              <a:gd name="connsiteX12" fmla="*/ 0 w 3474720"/>
+              <a:gd name="connsiteY12" fmla="*/ 0 h 18288"/>
+            </a:gdLst>
+            <a:ahLst/>
+            <a:cxnLst>
+              <a:cxn ang="0">
+                <a:pos x="connsiteX0" y="connsiteY0"/>
+              </a:cxn>
+              <a:cxn ang="0">
+                <a:pos x="connsiteX1" y="connsiteY1"/>
+              </a:cxn>
+              <a:cxn ang="0">
+                <a:pos x="connsiteX2" y="connsiteY2"/>
+              </a:cxn>
+              <a:cxn ang="0">
+                <a:pos x="connsiteX3" y="connsiteY3"/>
+              </a:cxn>
+              <a:cxn ang="0">
+                <a:pos x="connsiteX4" y="connsiteY4"/>
+              </a:cxn>
+              <a:cxn ang="0">
+                <a:pos x="connsiteX5" y="connsiteY5"/>
+              </a:cxn>
+              <a:cxn ang="0">
+                <a:pos x="connsiteX6" y="connsiteY6"/>
+              </a:cxn>
+              <a:cxn ang="0">
+                <a:pos x="connsiteX7" y="connsiteY7"/>
+              </a:cxn>
+              <a:cxn ang="0">
+                <a:pos x="connsiteX8" y="connsiteY8"/>
+              </a:cxn>
+              <a:cxn ang="0">
+                <a:pos x="connsiteX9" y="connsiteY9"/>
+              </a:cxn>
+              <a:cxn ang="0">
+                <a:pos x="connsiteX10" y="connsiteY10"/>
+              </a:cxn>
+              <a:cxn ang="0">
+                <a:pos x="connsiteX11" y="connsiteY11"/>
+              </a:cxn>
+              <a:cxn ang="0">
+                <a:pos x="connsiteX12" y="connsiteY12"/>
+              </a:cxn>
+            </a:cxnLst>
+            <a:rect l="l" t="t" r="r" b="b"/>
+            <a:pathLst>
+              <a:path w="3474720" h="18288" fill="none" extrusionOk="0">
+                <a:moveTo>
+                  <a:pt x="0" y="0"/>
+                </a:moveTo>
+                <a:cubicBezTo>
+                  <a:pt x="224454" y="-14544"/>
+                  <a:pt x="495407" y="26540"/>
+                  <a:pt x="694944" y="0"/>
+                </a:cubicBezTo>
+                <a:cubicBezTo>
+                  <a:pt x="894481" y="-26540"/>
+                  <a:pt x="1130063" y="24713"/>
+                  <a:pt x="1355141" y="0"/>
+                </a:cubicBezTo>
+                <a:cubicBezTo>
+                  <a:pt x="1580219" y="-24713"/>
+                  <a:pt x="1820099" y="26695"/>
+                  <a:pt x="2015338" y="0"/>
+                </a:cubicBezTo>
+                <a:cubicBezTo>
+                  <a:pt x="2210577" y="-26695"/>
+                  <a:pt x="2402045" y="165"/>
+                  <a:pt x="2779776" y="0"/>
+                </a:cubicBezTo>
+                <a:cubicBezTo>
+                  <a:pt x="3157507" y="-165"/>
+                  <a:pt x="3286859" y="-15571"/>
+                  <a:pt x="3474720" y="0"/>
+                </a:cubicBezTo>
+                <a:cubicBezTo>
+                  <a:pt x="3474286" y="7551"/>
+                  <a:pt x="3474253" y="9822"/>
+                  <a:pt x="3474720" y="18288"/>
+                </a:cubicBezTo>
+                <a:cubicBezTo>
+                  <a:pt x="3233904" y="29845"/>
+                  <a:pt x="2945134" y="-5256"/>
+                  <a:pt x="2779776" y="18288"/>
+                </a:cubicBezTo>
+                <a:cubicBezTo>
+                  <a:pt x="2614418" y="41832"/>
+                  <a:pt x="2339768" y="22709"/>
+                  <a:pt x="2189074" y="18288"/>
+                </a:cubicBezTo>
+                <a:cubicBezTo>
+                  <a:pt x="2038380" y="13867"/>
+                  <a:pt x="1817434" y="-4947"/>
+                  <a:pt x="1528877" y="18288"/>
+                </a:cubicBezTo>
+                <a:cubicBezTo>
+                  <a:pt x="1240320" y="41523"/>
+                  <a:pt x="1042447" y="37198"/>
+                  <a:pt x="868680" y="18288"/>
+                </a:cubicBezTo>
+                <a:cubicBezTo>
+                  <a:pt x="694913" y="-622"/>
+                  <a:pt x="233232" y="44909"/>
+                  <a:pt x="0" y="18288"/>
+                </a:cubicBezTo>
+                <a:cubicBezTo>
+                  <a:pt x="60" y="11696"/>
+                  <a:pt x="66" y="3758"/>
+                  <a:pt x="0" y="0"/>
+                </a:cubicBezTo>
+                <a:close/>
+              </a:path>
+              <a:path w="3474720" h="18288" stroke="0" extrusionOk="0">
+                <a:moveTo>
+                  <a:pt x="0" y="0"/>
+                </a:moveTo>
+                <a:cubicBezTo>
+                  <a:pt x="202328" y="-14716"/>
+                  <a:pt x="332722" y="-11499"/>
+                  <a:pt x="625450" y="0"/>
+                </a:cubicBezTo>
+                <a:cubicBezTo>
+                  <a:pt x="918178" y="11499"/>
+                  <a:pt x="1096688" y="5123"/>
+                  <a:pt x="1389888" y="0"/>
+                </a:cubicBezTo>
+                <a:cubicBezTo>
+                  <a:pt x="1683088" y="-5123"/>
+                  <a:pt x="1835981" y="-14038"/>
+                  <a:pt x="1980590" y="0"/>
+                </a:cubicBezTo>
+                <a:cubicBezTo>
+                  <a:pt x="2125199" y="14038"/>
+                  <a:pt x="2396099" y="-7203"/>
+                  <a:pt x="2571293" y="0"/>
+                </a:cubicBezTo>
+                <a:cubicBezTo>
+                  <a:pt x="2746487" y="7203"/>
+                  <a:pt x="3041609" y="-12036"/>
+                  <a:pt x="3474720" y="0"/>
+                </a:cubicBezTo>
+                <a:cubicBezTo>
+                  <a:pt x="3474638" y="4406"/>
+                  <a:pt x="3474631" y="9982"/>
+                  <a:pt x="3474720" y="18288"/>
+                </a:cubicBezTo>
+                <a:cubicBezTo>
+                  <a:pt x="3324873" y="21876"/>
+                  <a:pt x="3136771" y="12587"/>
+                  <a:pt x="2814523" y="18288"/>
+                </a:cubicBezTo>
+                <a:cubicBezTo>
+                  <a:pt x="2492275" y="23989"/>
+                  <a:pt x="2294402" y="47111"/>
+                  <a:pt x="2154326" y="18288"/>
+                </a:cubicBezTo>
+                <a:cubicBezTo>
+                  <a:pt x="2014250" y="-10535"/>
+                  <a:pt x="1820317" y="33903"/>
+                  <a:pt x="1494130" y="18288"/>
+                </a:cubicBezTo>
+                <a:cubicBezTo>
+                  <a:pt x="1167943" y="2673"/>
+                  <a:pt x="948432" y="14868"/>
+                  <a:pt x="729691" y="18288"/>
+                </a:cubicBezTo>
+                <a:cubicBezTo>
+                  <a:pt x="510950" y="21708"/>
+                  <a:pt x="264032" y="24354"/>
+                  <a:pt x="0" y="18288"/>
+                </a:cubicBezTo>
+                <a:cubicBezTo>
+                  <a:pt x="189" y="14288"/>
+                  <a:pt x="-703" y="3747"/>
+                  <a:pt x="0" y="0"/>
+                </a:cubicBezTo>
+                <a:close/>
+              </a:path>
+            </a:pathLst>
+          </a:custGeom>
+          <a:solidFill>
+            <a:schemeClr val="accent2"/>
+          </a:solidFill>
+          <a:ln w="44450" cap="rnd">
+            <a:solidFill>
+              <a:schemeClr val="accent2"/>
+            </a:solidFill>
+            <a:round/>
+            <a:extLst>
+              <a:ext uri="{C807C97D-BFC1-408E-A445-0C87EB9F89A2}">
+                <ask:lineSketchStyleProps xmlns:ask="http://schemas.microsoft.com/office/drawing/2018/sketchyshapes" sd="2863741219">
+                  <a:prstGeom prst="rect">
+                    <a:avLst/>
+                  </a:prstGeom>
+                  <ask:type>
+                    <ask:lineSketchFreehand/>
+                  </ask:type>
+                </ask:lineSketchStyleProps>
+              </a:ext>
+            </a:extLst>
+          </a:ln>
+        </p:spPr>
+        <p:style>
+          <a:lnRef idx="2">
+            <a:schemeClr val="accent1">
+              <a:shade val="50000"/>
+            </a:schemeClr>
+          </a:lnRef>
+          <a:fillRef idx="1">
+            <a:schemeClr val="accent1"/>
+          </a:fillRef>
+          <a:effectRef idx="0">
+            <a:schemeClr val="accent1"/>
+          </a:effectRef>
+          <a:fontRef idx="minor">
+            <a:schemeClr val="lt1"/>
+          </a:fontRef>
+        </p:style>
+        <p:txBody>
+          <a:bodyPr rtlCol="0" anchor="ctr"/>
+          <a:lstStyle/>
+          <a:p>
+            <a:pPr algn="ctr"/>
+            <a:endParaRPr lang="en-US"/>
+          </a:p>
+        </p:txBody>
+      </p:sp>
+      <p:sp>
+        <p:nvSpPr>
+          <p:cNvPr id="3" name="Content Placeholder 2">
+            <a:extLst>
+              <a:ext uri="{FF2B5EF4-FFF2-40B4-BE49-F238E27FC236}">
+                <a16:creationId xmlns:a16="http://schemas.microsoft.com/office/drawing/2014/main" id="{247882B2-0D23-323E-A5F8-AD206D3F2E04}"/>
+              </a:ext>
+            </a:extLst>
+          </p:cNvPr>
+          <p:cNvSpPr>
+            <a:spLocks noGrp="1"/>
+          </p:cNvSpPr>
+          <p:nvPr>
+            <p:ph idx="1"/>
+          </p:nvPr>
+        </p:nvSpPr>
+        <p:spPr>
+          <a:xfrm>
+            <a:off x="640080" y="2872899"/>
+            <a:ext cx="4243589" cy="3320668"/>
+          </a:xfrm>
+        </p:spPr>
+        <p:txBody>
+          <a:bodyPr>
+            <a:normAutofit/>
+          </a:bodyPr>
+          <a:lstStyle/>
+          <a:p>
+            <a:pPr>
+              <a:buFont typeface="Wingdings" pitchFamily="2" charset="2"/>
+              <a:buChar char="q"/>
+            </a:pPr>
+            <a:r>
+              <a:rPr lang="en-US" sz="2200" dirty="0"/>
+              <a:t>The ticket price has room for increasing and the revenues can be increased by facilities improvement. </a:t>
+            </a:r>
+          </a:p>
+          <a:p>
+            <a:pPr>
+              <a:buFont typeface="Wingdings" pitchFamily="2" charset="2"/>
+              <a:buChar char="q"/>
+            </a:pPr>
+            <a:r>
+              <a:rPr lang="en-US" sz="2200" dirty="0"/>
+              <a:t>The primary goal of this object is achieved. </a:t>
+            </a:r>
+          </a:p>
+        </p:txBody>
+      </p:sp>
       <p:pic>
         <p:nvPicPr>
-          <p:cNvPr id="15" name="Picture 14">
-            <a:extLst>
-              <a:ext uri="{FF2B5EF4-FFF2-40B4-BE49-F238E27FC236}">
-                <a16:creationId xmlns:a16="http://schemas.microsoft.com/office/drawing/2014/main" id="{D7CEA2D1-EA7A-EE38-42A1-E047C1A0A9A0}"/>
+          <p:cNvPr id="5" name="Picture 4" descr="Graph">
+            <a:extLst>
+              <a:ext uri="{FF2B5EF4-FFF2-40B4-BE49-F238E27FC236}">
+                <a16:creationId xmlns:a16="http://schemas.microsoft.com/office/drawing/2014/main" id="{1C2896E6-FE74-B348-11CB-78C9DAA08CC1}"/>
               </a:ext>
             </a:extLst>
           </p:cNvPr>
@@ -8958,147 +8047,137 @@
           </p:cNvPicPr>
           <p:nvPr/>
         </p:nvPicPr>
-        <p:blipFill>
+        <p:blipFill rotWithShape="1">
           <a:blip r:embed="rId2"/>
-          <a:srcRect/>
+          <a:srcRect l="13022" r="24288"/>
           <a:stretch/>
         </p:blipFill>
         <p:spPr>
           <a:xfrm>
-            <a:off x="6437437" y="241961"/>
-            <a:ext cx="5758796" cy="3163549"/>
+            <a:off x="5311702" y="10"/>
+            <a:ext cx="6878775" cy="6857990"/>
           </a:xfrm>
-          <a:prstGeom prst="rect">
+          <a:custGeom>
             <a:avLst/>
-          </a:prstGeom>
+            <a:gdLst/>
+            <a:ahLst/>
+            <a:cxnLst/>
+            <a:rect l="l" t="t" r="r" b="b"/>
+            <a:pathLst>
+              <a:path w="6878775" h="6858000">
+                <a:moveTo>
+                  <a:pt x="1102973" y="0"/>
+                </a:moveTo>
+                <a:lnTo>
+                  <a:pt x="1160688" y="0"/>
+                </a:lnTo>
+                <a:lnTo>
+                  <a:pt x="983189" y="331786"/>
+                </a:lnTo>
+                <a:cubicBezTo>
+                  <a:pt x="914866" y="469145"/>
+                  <a:pt x="850355" y="608712"/>
+                  <a:pt x="789261" y="750263"/>
+                </a:cubicBezTo>
+                <a:cubicBezTo>
+                  <a:pt x="774307" y="784928"/>
+                  <a:pt x="759992" y="819849"/>
+                  <a:pt x="745295" y="854514"/>
+                </a:cubicBezTo>
+                <a:cubicBezTo>
+                  <a:pt x="756682" y="845393"/>
+                  <a:pt x="765489" y="833492"/>
+                  <a:pt x="770857" y="819975"/>
+                </a:cubicBezTo>
+                <a:cubicBezTo>
+                  <a:pt x="879943" y="589569"/>
+                  <a:pt x="999605" y="365513"/>
+                  <a:pt x="1131329" y="148742"/>
+                </a:cubicBezTo>
+                <a:lnTo>
+                  <a:pt x="1227589" y="0"/>
+                </a:lnTo>
+                <a:lnTo>
+                  <a:pt x="6878775" y="0"/>
+                </a:lnTo>
+                <a:lnTo>
+                  <a:pt x="6878775" y="6858000"/>
+                </a:lnTo>
+                <a:lnTo>
+                  <a:pt x="713521" y="6858000"/>
+                </a:lnTo>
+                <a:lnTo>
+                  <a:pt x="625642" y="6670527"/>
+                </a:lnTo>
+                <a:cubicBezTo>
+                  <a:pt x="507232" y="6398531"/>
+                  <a:pt x="403083" y="6118381"/>
+                  <a:pt x="312785" y="5830359"/>
+                </a:cubicBezTo>
+                <a:cubicBezTo>
+                  <a:pt x="278149" y="5719759"/>
+                  <a:pt x="248879" y="5607635"/>
+                  <a:pt x="212198" y="5480401"/>
+                </a:cubicBezTo>
+                <a:cubicBezTo>
+                  <a:pt x="212208" y="5491601"/>
+                  <a:pt x="212803" y="5502788"/>
+                  <a:pt x="213988" y="5513923"/>
+                </a:cubicBezTo>
+                <a:cubicBezTo>
+                  <a:pt x="264089" y="5723695"/>
+                  <a:pt x="307290" y="5935370"/>
+                  <a:pt x="365826" y="6142729"/>
+                </a:cubicBezTo>
+                <a:cubicBezTo>
+                  <a:pt x="433152" y="6380817"/>
+                  <a:pt x="510068" y="6614016"/>
+                  <a:pt x="597975" y="6841549"/>
+                </a:cubicBezTo>
+                <a:lnTo>
+                  <a:pt x="604824" y="6858000"/>
+                </a:lnTo>
+                <a:lnTo>
+                  <a:pt x="552056" y="6858000"/>
+                </a:lnTo>
+                <a:lnTo>
+                  <a:pt x="539576" y="6828295"/>
+                </a:lnTo>
+                <a:cubicBezTo>
+                  <a:pt x="380597" y="6414594"/>
+                  <a:pt x="260223" y="5988893"/>
+                  <a:pt x="171555" y="5552906"/>
+                </a:cubicBezTo>
+                <a:cubicBezTo>
+                  <a:pt x="91163" y="5157998"/>
+                  <a:pt x="43746" y="4758899"/>
+                  <a:pt x="12305" y="4357388"/>
+                </a:cubicBezTo>
+                <a:cubicBezTo>
+                  <a:pt x="-14281" y="4013908"/>
+                  <a:pt x="4507" y="3672965"/>
+                  <a:pt x="46684" y="3331516"/>
+                </a:cubicBezTo>
+                <a:cubicBezTo>
+                  <a:pt x="127203" y="2664286"/>
+                  <a:pt x="277819" y="2007265"/>
+                  <a:pt x="496065" y="1371196"/>
+                </a:cubicBezTo>
+                <a:cubicBezTo>
+                  <a:pt x="636273" y="966066"/>
+                  <a:pt x="800445" y="573253"/>
+                  <a:pt x="995723" y="196614"/>
+                </a:cubicBezTo>
+                <a:close/>
+              </a:path>
+            </a:pathLst>
+          </a:custGeom>
         </p:spPr>
       </p:pic>
-      <p:pic>
-        <p:nvPicPr>
-          <p:cNvPr id="17" name="Picture 16">
-            <a:extLst>
-              <a:ext uri="{FF2B5EF4-FFF2-40B4-BE49-F238E27FC236}">
-                <a16:creationId xmlns:a16="http://schemas.microsoft.com/office/drawing/2014/main" id="{22F6911D-9F7A-FC6F-9D83-444A81D709D8}"/>
-              </a:ext>
-            </a:extLst>
-          </p:cNvPr>
-          <p:cNvPicPr>
-            <a:picLocks noChangeAspect="1"/>
-          </p:cNvPicPr>
-          <p:nvPr/>
-        </p:nvPicPr>
-        <p:blipFill>
-          <a:blip r:embed="rId3"/>
-          <a:srcRect/>
-          <a:stretch/>
-        </p:blipFill>
-        <p:spPr>
-          <a:xfrm>
-            <a:off x="6437437" y="3675280"/>
-            <a:ext cx="5754564" cy="3171657"/>
-          </a:xfrm>
-          <a:prstGeom prst="rect">
-            <a:avLst/>
-          </a:prstGeom>
-        </p:spPr>
-      </p:pic>
-      <p:sp>
-        <p:nvSpPr>
-          <p:cNvPr id="18" name="Title 1">
-            <a:extLst>
-              <a:ext uri="{FF2B5EF4-FFF2-40B4-BE49-F238E27FC236}">
-                <a16:creationId xmlns:a16="http://schemas.microsoft.com/office/drawing/2014/main" id="{AC7E46E1-A036-8216-7765-2CBE689D1ACC}"/>
-              </a:ext>
-            </a:extLst>
-          </p:cNvPr>
-          <p:cNvSpPr>
-            <a:spLocks noGrp="1"/>
-          </p:cNvSpPr>
-          <p:nvPr>
-            <p:ph type="title"/>
-          </p:nvPr>
-        </p:nvSpPr>
-        <p:spPr>
-          <a:xfrm>
-            <a:off x="655068" y="959948"/>
-            <a:ext cx="5266045" cy="1727574"/>
-          </a:xfrm>
-        </p:spPr>
-        <p:txBody>
-          <a:bodyPr anchor="b">
-            <a:noAutofit/>
-          </a:bodyPr>
-          <a:lstStyle/>
-          <a:p>
-            <a:r>
-              <a:rPr lang="en-US" sz="3000" dirty="0">
-                <a:latin typeface="+mn-lt"/>
-              </a:rPr>
-              <a:t>Most resorts have no fast quads. Big Mountain has 3, which puts it high up that league table.</a:t>
-            </a:r>
-          </a:p>
-        </p:txBody>
-      </p:sp>
-      <p:sp>
-        <p:nvSpPr>
-          <p:cNvPr id="19" name="Title 1">
-            <a:extLst>
-              <a:ext uri="{FF2B5EF4-FFF2-40B4-BE49-F238E27FC236}">
-                <a16:creationId xmlns:a16="http://schemas.microsoft.com/office/drawing/2014/main" id="{CC99FE75-516F-3DCE-6080-7FE02D010618}"/>
-              </a:ext>
-            </a:extLst>
-          </p:cNvPr>
-          <p:cNvSpPr txBox="1">
-            <a:spLocks/>
-          </p:cNvSpPr>
-          <p:nvPr/>
-        </p:nvSpPr>
-        <p:spPr>
-          <a:xfrm>
-            <a:off x="655069" y="4339213"/>
-            <a:ext cx="5266045" cy="1843790"/>
-          </a:xfrm>
-          <a:prstGeom prst="rect">
-            <a:avLst/>
-          </a:prstGeom>
-        </p:spPr>
-        <p:txBody>
-          <a:bodyPr vert="horz" lIns="91440" tIns="45720" rIns="91440" bIns="45720" rtlCol="0" anchor="b">
-            <a:normAutofit fontScale="97500"/>
-          </a:bodyPr>
-          <a:lstStyle>
-            <a:lvl1pPr algn="l" defTabSz="914400" rtl="0" eaLnBrk="1" latinLnBrk="0" hangingPunct="1">
-              <a:lnSpc>
-                <a:spcPct val="90000"/>
-              </a:lnSpc>
-              <a:spcBef>
-                <a:spcPct val="0"/>
-              </a:spcBef>
-              <a:buNone/>
-              <a:defRPr sz="4400" kern="1200">
-                <a:solidFill>
-                  <a:schemeClr val="tx1"/>
-                </a:solidFill>
-                <a:latin typeface="+mj-lt"/>
-                <a:ea typeface="+mj-ea"/>
-                <a:cs typeface="+mj-cs"/>
-              </a:defRPr>
-            </a:lvl1pPr>
-          </a:lstStyle>
-          <a:p>
-            <a:r>
-              <a:rPr lang="en-US" sz="3100" dirty="0">
-                <a:latin typeface="+mn-lt"/>
-              </a:rPr>
-              <a:t>Big Mountain compares well for the number of runs. There are some resorts with more, but not many.</a:t>
-            </a:r>
-          </a:p>
-        </p:txBody>
-      </p:sp>
     </p:spTree>
     <p:extLst>
       <p:ext uri="{BB962C8B-B14F-4D97-AF65-F5344CB8AC3E}">
-        <p14:creationId xmlns:p14="http://schemas.microsoft.com/office/powerpoint/2010/main" val="3497096138"/>
+        <p14:creationId xmlns:p14="http://schemas.microsoft.com/office/powerpoint/2010/main" val="2933237685"/>
       </p:ext>
     </p:extLst>
   </p:cSld>
@@ -9139,7 +8218,7 @@
                                           </p:stCondLst>
                                         </p:cTn>
                                         <p:tgtEl>
-                                          <p:spTgt spid="18"/>
+                                          <p:spTgt spid="2"/>
                                         </p:tgtEl>
                                         <p:attrNameLst>
                                           <p:attrName>style.visibility</p:attrName>
@@ -9153,7 +8232,7 @@
                                       <p:cBhvr>
                                         <p:cTn id="7" dur="500"/>
                                         <p:tgtEl>
-                                          <p:spTgt spid="18"/>
+                                          <p:spTgt spid="2"/>
                                         </p:tgtEl>
                                       </p:cBhvr>
                                     </p:animEffect>
@@ -9192,7 +8271,11 @@
                                           </p:stCondLst>
                                         </p:cTn>
                                         <p:tgtEl>
-                                          <p:spTgt spid="19"/>
+                                          <p:spTgt spid="3">
+                                            <p:txEl>
+                                              <p:pRg st="0" end="0"/>
+                                            </p:txEl>
+                                          </p:spTgt>
                                         </p:tgtEl>
                                         <p:attrNameLst>
                                           <p:attrName>style.visibility</p:attrName>
@@ -9206,7 +8289,72 @@
                                       <p:cBhvr>
                                         <p:cTn id="12" dur="500"/>
                                         <p:tgtEl>
-                                          <p:spTgt spid="19"/>
+                                          <p:spTgt spid="3">
+                                            <p:txEl>
+                                              <p:pRg st="0" end="0"/>
+                                            </p:txEl>
+                                          </p:spTgt>
+                                        </p:tgtEl>
+                                      </p:cBhvr>
+                                    </p:animEffect>
+                                  </p:childTnLst>
+                                </p:cTn>
+                              </p:par>
+                            </p:childTnLst>
+                          </p:cTn>
+                        </p:par>
+                      </p:childTnLst>
+                    </p:cTn>
+                  </p:par>
+                  <p:par>
+                    <p:cTn id="13" fill="hold">
+                      <p:stCondLst>
+                        <p:cond delay="indefinite"/>
+                      </p:stCondLst>
+                      <p:childTnLst>
+                        <p:par>
+                          <p:cTn id="14" fill="hold">
+                            <p:stCondLst>
+                              <p:cond delay="0"/>
+                            </p:stCondLst>
+                            <p:childTnLst>
+                              <p:par>
+                                <p:cTn id="15" presetID="10" presetClass="entr" presetSubtype="0" fill="hold" grpId="0" nodeType="clickEffect">
+                                  <p:stCondLst>
+                                    <p:cond delay="0"/>
+                                  </p:stCondLst>
+                                  <p:childTnLst>
+                                    <p:set>
+                                      <p:cBhvr>
+                                        <p:cTn id="16" dur="1" fill="hold">
+                                          <p:stCondLst>
+                                            <p:cond delay="0"/>
+                                          </p:stCondLst>
+                                        </p:cTn>
+                                        <p:tgtEl>
+                                          <p:spTgt spid="3">
+                                            <p:txEl>
+                                              <p:pRg st="1" end="1"/>
+                                            </p:txEl>
+                                          </p:spTgt>
+                                        </p:tgtEl>
+                                        <p:attrNameLst>
+                                          <p:attrName>style.visibility</p:attrName>
+                                        </p:attrNameLst>
+                                      </p:cBhvr>
+                                      <p:to>
+                                        <p:strVal val="visible"/>
+                                      </p:to>
+                                    </p:set>
+                                    <p:animEffect transition="in" filter="fade">
+                                      <p:cBhvr>
+                                        <p:cTn id="17" dur="500"/>
+                                        <p:tgtEl>
+                                          <p:spTgt spid="3">
+                                            <p:txEl>
+                                              <p:pRg st="1" end="1"/>
+                                            </p:txEl>
+                                          </p:spTgt>
                                         </p:tgtEl>
                                       </p:cBhvr>
                                     </p:animEffect>
@@ -9241,8 +8389,8 @@
       </p:par>
     </p:tnLst>
     <p:bldLst>
-      <p:bldP spid="18" grpId="0"/>
-      <p:bldP spid="19" grpId="0"/>
+      <p:bldP spid="2" grpId="0"/>
+      <p:bldP spid="3" grpId="0" build="p"/>
     </p:bldLst>
   </p:timing>
 </p:sld>

</xml_diff>